<commit_message>
finished L7.1 - 7.3.  Need to get L7.4 up to new coding standards
</commit_message>
<xml_diff>
--- a/Slides/Lesson 7.3 When do I need an invariant.pptx
+++ b/Slides/Lesson 7.3 When do I need an invariant.pptx
@@ -5,7 +5,7 @@
     <p:sldMasterId id="2147483661" r:id="rId1"/>
   </p:sldMasterIdLst>
   <p:notesMasterIdLst>
-    <p:notesMasterId r:id="rId19"/>
+    <p:notesMasterId r:id="rId13"/>
   </p:notesMasterIdLst>
   <p:sldIdLst>
     <p:sldId id="257" r:id="rId2"/>
@@ -14,22 +14,16 @@
     <p:sldId id="269" r:id="rId5"/>
     <p:sldId id="273" r:id="rId6"/>
     <p:sldId id="260" r:id="rId7"/>
-    <p:sldId id="261" r:id="rId8"/>
-    <p:sldId id="262" r:id="rId9"/>
-    <p:sldId id="267" r:id="rId10"/>
-    <p:sldId id="268" r:id="rId11"/>
-    <p:sldId id="270" r:id="rId12"/>
-    <p:sldId id="263" r:id="rId13"/>
-    <p:sldId id="264" r:id="rId14"/>
-    <p:sldId id="276" r:id="rId15"/>
-    <p:sldId id="265" r:id="rId16"/>
-    <p:sldId id="274" r:id="rId17"/>
-    <p:sldId id="275" r:id="rId18"/>
+    <p:sldId id="268" r:id="rId8"/>
+    <p:sldId id="270" r:id="rId9"/>
+    <p:sldId id="265" r:id="rId10"/>
+    <p:sldId id="274" r:id="rId11"/>
+    <p:sldId id="275" r:id="rId12"/>
   </p:sldIdLst>
   <p:sldSz cx="9144000" cy="6858000" type="screen4x3"/>
   <p:notesSz cx="6858000" cy="9144000"/>
   <p:custDataLst>
-    <p:tags r:id="rId20"/>
+    <p:tags r:id="rId14"/>
   </p:custDataLst>
   <p:defaultTextStyle>
     <a:defPPr>
@@ -145,6 +139,10 @@
 </p:presentation>
 </file>
 
+<file path=ppt/revisionInfo.xml><?xml version="1.0" encoding="utf-8"?>
+<p1510:revInfo xmlns:a="http://schemas.openxmlformats.org/drawingml/2006/main" xmlns:r="http://schemas.openxmlformats.org/officeDocument/2006/relationships" xmlns:p1510="http://schemas.microsoft.com/office/powerpoint/2015/10/main"/>
+</file>
+
 <file path=ppt/notesMasters/notesMaster1.xml><?xml version="1.0" encoding="utf-8"?>
 <p:notesMaster xmlns:a="http://schemas.openxmlformats.org/drawingml/2006/main" xmlns:r="http://schemas.openxmlformats.org/officeDocument/2006/relationships" xmlns:p="http://schemas.openxmlformats.org/presentationml/2006/main">
   <p:cSld>
@@ -227,7 +225,7 @@
           <a:p>
             <a:fld id="{7CCEC190-264F-4177-B826-2198B6EDA822}" type="datetimeFigureOut">
               <a:rPr lang="en-US" smtClean="0"/>
-              <a:t>10/23/2016</a:t>
+              <a:t>10/1/2017</a:t>
             </a:fld>
             <a:endParaRPr lang="en-US"/>
           </a:p>
@@ -733,7 +731,7 @@
           <a:p>
             <a:fld id="{A28484B4-7F93-45CD-84A0-E7476B171D3B}" type="slidenum">
               <a:rPr lang="en-US" smtClean="0"/>
-              <a:t>15</a:t>
+              <a:t>9</a:t>
             </a:fld>
             <a:endParaRPr lang="en-US"/>
           </a:p>
@@ -931,7 +929,7 @@
           <a:p>
             <a:fld id="{2F1F79F5-7BEC-496A-AFC7-876E38F64D71}" type="datetime1">
               <a:rPr lang="en-US" smtClean="0"/>
-              <a:t>10/23/2016</a:t>
+              <a:t>10/1/2017</a:t>
             </a:fld>
             <a:endParaRPr lang="en-US"/>
           </a:p>
@@ -1026,7 +1024,7 @@
           <a:p>
             <a:fld id="{0A05703A-7669-4FEA-9056-25299B4D29D4}" type="datetime1">
               <a:rPr lang="en-US" smtClean="0"/>
-              <a:t>10/23/2016</a:t>
+              <a:t>10/1/2017</a:t>
             </a:fld>
             <a:endParaRPr lang="en-US"/>
           </a:p>
@@ -1301,7 +1299,7 @@
           <a:p>
             <a:fld id="{6E5077B5-BB57-49DB-88CA-226A139E5C01}" type="datetime1">
               <a:rPr lang="en-US" smtClean="0"/>
-              <a:t>10/23/2016</a:t>
+              <a:t>10/1/2017</a:t>
             </a:fld>
             <a:endParaRPr lang="en-US"/>
           </a:p>
@@ -1553,7 +1551,7 @@
           <a:p>
             <a:fld id="{C48D9447-CBD6-49A1-89FD-8512A8CF8999}" type="datetime1">
               <a:rPr lang="en-US" smtClean="0"/>
-              <a:t>10/23/2016</a:t>
+              <a:t>10/1/2017</a:t>
             </a:fld>
             <a:endParaRPr lang="en-US"/>
           </a:p>
@@ -1721,7 +1719,7 @@
           <a:p>
             <a:fld id="{A3639A2A-823D-48B7-9ACE-7FAF42870BA9}" type="datetime1">
               <a:rPr lang="en-US" smtClean="0"/>
-              <a:t>10/23/2016</a:t>
+              <a:t>10/1/2017</a:t>
             </a:fld>
             <a:endParaRPr lang="en-US"/>
           </a:p>
@@ -1899,7 +1897,7 @@
           <a:p>
             <a:fld id="{ED1B6996-82E9-463C-972C-7B56056E426C}" type="datetime1">
               <a:rPr lang="en-US" smtClean="0"/>
-              <a:t>10/23/2016</a:t>
+              <a:t>10/1/2017</a:t>
             </a:fld>
             <a:endParaRPr lang="en-US"/>
           </a:p>
@@ -2073,7 +2071,7 @@
           <a:p>
             <a:fld id="{E22ED4DA-448D-4BB1-B935-CC112220207B}" type="datetime1">
               <a:rPr lang="en-US" smtClean="0"/>
-              <a:t>10/23/2016</a:t>
+              <a:t>10/1/2017</a:t>
             </a:fld>
             <a:endParaRPr lang="en-US"/>
           </a:p>
@@ -2246,7 +2244,7 @@
           <a:p>
             <a:fld id="{E22ED4DA-448D-4BB1-B935-CC112220207B}" type="datetime1">
               <a:rPr lang="en-US" smtClean="0"/>
-              <a:t>10/23/2016</a:t>
+              <a:t>10/1/2017</a:t>
             </a:fld>
             <a:endParaRPr lang="en-US"/>
           </a:p>
@@ -2506,7 +2504,7 @@
           <a:p>
             <a:fld id="{FF5D65A6-AB94-4435-B0B7-3743215FA46C}" type="datetime1">
               <a:rPr lang="en-US" smtClean="0"/>
-              <a:t>10/23/2016</a:t>
+              <a:t>10/1/2017</a:t>
             </a:fld>
             <a:endParaRPr lang="en-US"/>
           </a:p>
@@ -2682,7 +2680,7 @@
           <a:p>
             <a:fld id="{FF5D65A6-AB94-4435-B0B7-3743215FA46C}" type="datetime1">
               <a:rPr lang="en-US" smtClean="0"/>
-              <a:t>10/23/2016</a:t>
+              <a:t>10/1/2017</a:t>
             </a:fld>
             <a:endParaRPr lang="en-US"/>
           </a:p>
@@ -2976,7 +2974,7 @@
           <a:p>
             <a:fld id="{7C193DC4-6EF0-48C9-B29C-616106A645E1}" type="datetime1">
               <a:rPr lang="en-US" smtClean="0"/>
-              <a:t>10/23/2016</a:t>
+              <a:t>10/1/2017</a:t>
             </a:fld>
             <a:endParaRPr lang="en-US"/>
           </a:p>
@@ -3261,7 +3259,7 @@
           <a:p>
             <a:fld id="{5D1846AD-9252-4647-9435-4C2AC365653A}" type="datetime1">
               <a:rPr lang="en-US" smtClean="0"/>
-              <a:t>10/23/2016</a:t>
+              <a:t>10/1/2017</a:t>
             </a:fld>
             <a:endParaRPr lang="en-US"/>
           </a:p>
@@ -3680,7 +3678,7 @@
           <a:p>
             <a:fld id="{CE56DC10-3561-4063-A6AF-C1CC7A41040A}" type="datetime1">
               <a:rPr lang="en-US" smtClean="0"/>
-              <a:t>10/23/2016</a:t>
+              <a:t>10/1/2017</a:t>
             </a:fld>
             <a:endParaRPr lang="en-US"/>
           </a:p>
@@ -3797,7 +3795,7 @@
           <a:p>
             <a:fld id="{2F7B77F5-1464-4F6B-92A8-64FC8A508293}" type="datetime1">
               <a:rPr lang="en-US" smtClean="0"/>
-              <a:t>10/23/2016</a:t>
+              <a:t>10/1/2017</a:t>
             </a:fld>
             <a:endParaRPr lang="en-US"/>
           </a:p>
@@ -4020,7 +4018,7 @@
           <a:p>
             <a:fld id="{02B3F677-983B-48DB-ADFD-63FE6CBC7FB2}" type="datetime1">
               <a:rPr lang="en-US" smtClean="0"/>
-              <a:t>10/23/2016</a:t>
+              <a:t>10/1/2017</a:t>
             </a:fld>
             <a:endParaRPr lang="en-US"/>
           </a:p>
@@ -4694,14 +4692,12 @@
         </p:nvSpPr>
         <p:spPr/>
         <p:txBody>
-          <a:bodyPr>
-            <a:normAutofit fontScale="90000"/>
-          </a:bodyPr>
+          <a:bodyPr/>
           <a:lstStyle/>
           <a:p>
             <a:r>
               <a:rPr lang="en-US" dirty="0"/>
-              <a:t>Once more: When do I need an invariant?</a:t>
+              <a:t>Summary</a:t>
             </a:r>
           </a:p>
         </p:txBody>
@@ -4723,13 +4719,14 @@
           <a:p>
             <a:r>
               <a:rPr lang="en-US" dirty="0"/>
-              <a:t>If your code fulfills the purpose statement for any arguments of the types listed in the contract, you don't need an invariant.</a:t>
-            </a:r>
-          </a:p>
-          <a:p>
+              <a:t>The student should now be able to</a:t>
+            </a:r>
+          </a:p>
+          <a:p>
+            <a:pPr lvl="1"/>
             <a:r>
               <a:rPr lang="en-US" dirty="0"/>
-              <a:t>If the function only works for certain values or combinations of values of the arguments, then you must document the assumptions that it needs with a WHERE-clause (i.e. an invariant).</a:t>
+              <a:t>decide whether a purpose statement needs an invariant or not.</a:t>
             </a:r>
           </a:p>
           <a:p>
@@ -4763,7 +4760,7 @@
     </p:spTree>
     <p:extLst>
       <p:ext uri="{BB962C8B-B14F-4D97-AF65-F5344CB8AC3E}">
-        <p14:creationId xmlns:p14="http://schemas.microsoft.com/office/powerpoint/2010/main" val="2189872519"/>
+        <p14:creationId xmlns:p14="http://schemas.microsoft.com/office/powerpoint/2010/main" val="1310055986"/>
       </p:ext>
     </p:extLst>
   </p:cSld>
@@ -4802,14 +4799,12 @@
         </p:nvSpPr>
         <p:spPr/>
         <p:txBody>
-          <a:bodyPr>
-            <a:normAutofit fontScale="90000"/>
-          </a:bodyPr>
+          <a:bodyPr/>
           <a:lstStyle/>
           <a:p>
             <a:r>
               <a:rPr lang="en-US" dirty="0"/>
-              <a:t>What needs to be in my purpose statement?</a:t>
+              <a:t>Next Steps</a:t>
             </a:r>
           </a:p>
         </p:txBody>
@@ -4826,39 +4821,22 @@
         </p:nvSpPr>
         <p:spPr/>
         <p:txBody>
-          <a:bodyPr>
-            <a:noAutofit/>
-          </a:bodyPr>
-          <a:lstStyle/>
-          <a:p>
-            <a:r>
-              <a:rPr lang="en-US" sz="2400" dirty="0"/>
-              <a:t>The purpose statement must account for all the parameters.</a:t>
-            </a:r>
-          </a:p>
-          <a:p>
-            <a:pPr lvl="1"/>
-            <a:r>
-              <a:rPr lang="en-US" sz="2000" dirty="0"/>
-              <a:t>if it doesn't then either you are passing more parameters than you need, or there's something going on that you haven't described.</a:t>
-            </a:r>
-          </a:p>
-          <a:p>
-            <a:r>
-              <a:rPr lang="en-US" sz="2400" dirty="0"/>
-              <a:t>The RETURNS clause must describe the value returned by the function for all possible values of the parameters.</a:t>
-            </a:r>
-          </a:p>
-          <a:p>
-            <a:r>
-              <a:rPr lang="en-US" sz="2400" dirty="0"/>
-              <a:t>If the RETURNS clause describes the value returned by the function only for some values of the arguments or some combination of arguments, then that restriction must be stated in a WHERE clause.</a:t>
-            </a:r>
-          </a:p>
-          <a:p>
-            <a:r>
-              <a:rPr lang="en-US" sz="2400" dirty="0"/>
-              <a:t>It becomes the responsibility of the caller to guarantee that the restriction is satisfied.</a:t>
+          <a:bodyPr/>
+          <a:lstStyle/>
+          <a:p>
+            <a:r>
+              <a:rPr lang="en-US" dirty="0"/>
+              <a:t>If you have questions about this lesson, ask them on the Discussion Board</a:t>
+            </a:r>
+          </a:p>
+          <a:p>
+            <a:r>
+              <a:rPr lang="en-US"/>
+              <a:t>Go </a:t>
+            </a:r>
+            <a:r>
+              <a:rPr lang="en-US" dirty="0"/>
+              <a:t>on to the next lesson</a:t>
             </a:r>
           </a:p>
         </p:txBody>
@@ -4881,1306 +4859,6 @@
             <a:fld id="{4FF46DE1-096B-4EDD-A00F-DA0292705DA0}" type="slidenum">
               <a:rPr lang="en-US" smtClean="0"/>
               <a:t>11</a:t>
-            </a:fld>
-            <a:endParaRPr lang="en-US"/>
-          </a:p>
-        </p:txBody>
-      </p:sp>
-    </p:spTree>
-    <p:extLst>
-      <p:ext uri="{BB962C8B-B14F-4D97-AF65-F5344CB8AC3E}">
-        <p14:creationId xmlns:p14="http://schemas.microsoft.com/office/powerpoint/2010/main" val="1327706209"/>
-      </p:ext>
-    </p:extLst>
-  </p:cSld>
-  <p:clrMapOvr>
-    <a:masterClrMapping/>
-  </p:clrMapOvr>
-</p:sld>
-</file>
-
-<file path=ppt/slides/slide12.xml><?xml version="1.0" encoding="utf-8"?>
-<p:sld xmlns:a="http://schemas.openxmlformats.org/drawingml/2006/main" xmlns:r="http://schemas.openxmlformats.org/officeDocument/2006/relationships" xmlns:p="http://schemas.openxmlformats.org/presentationml/2006/main">
-  <p:cSld>
-    <p:spTree>
-      <p:nvGrpSpPr>
-        <p:cNvPr id="1" name=""/>
-        <p:cNvGrpSpPr/>
-        <p:nvPr/>
-      </p:nvGrpSpPr>
-      <p:grpSpPr>
-        <a:xfrm>
-          <a:off x="0" y="0"/>
-          <a:ext cx="0" cy="0"/>
-          <a:chOff x="0" y="0"/>
-          <a:chExt cx="0" cy="0"/>
-        </a:xfrm>
-      </p:grpSpPr>
-      <p:sp>
-        <p:nvSpPr>
-          <p:cNvPr id="2" name="Title 1"/>
-          <p:cNvSpPr>
-            <a:spLocks noGrp="1"/>
-          </p:cNvSpPr>
-          <p:nvPr>
-            <p:ph type="title"/>
-          </p:nvPr>
-        </p:nvSpPr>
-        <p:spPr/>
-        <p:txBody>
-          <a:bodyPr/>
-          <a:lstStyle/>
-          <a:p>
-            <a:r>
-              <a:rPr lang="en-US" dirty="0"/>
-              <a:t>Another example</a:t>
-            </a:r>
-          </a:p>
-        </p:txBody>
-      </p:sp>
-      <p:sp>
-        <p:nvSpPr>
-          <p:cNvPr id="4" name="Content Placeholder 3"/>
-          <p:cNvSpPr>
-            <a:spLocks noGrp="1"/>
-          </p:cNvSpPr>
-          <p:nvPr>
-            <p:ph idx="1"/>
-          </p:nvPr>
-        </p:nvSpPr>
-        <p:spPr/>
-        <p:txBody>
-          <a:bodyPr>
-            <a:normAutofit fontScale="70000" lnSpcReduction="20000"/>
-          </a:bodyPr>
-          <a:lstStyle/>
-          <a:p>
-            <a:r>
-              <a:rPr lang="en-US" dirty="0"/>
-              <a:t>;; add-remaining-length : </a:t>
-            </a:r>
-            <a:r>
-              <a:rPr lang="en-US" dirty="0" err="1"/>
-              <a:t>LoN</a:t>
-            </a:r>
-            <a:r>
-              <a:rPr lang="en-US" dirty="0"/>
-              <a:t> -&gt; </a:t>
-            </a:r>
-            <a:r>
-              <a:rPr lang="en-US" dirty="0" err="1"/>
-              <a:t>LoN</a:t>
-            </a:r>
-            <a:endParaRPr lang="en-US" dirty="0"/>
-          </a:p>
-          <a:p>
-            <a:r>
-              <a:rPr lang="en-US" dirty="0"/>
-              <a:t>;; RETURNS: a list like the original, but with each</a:t>
-            </a:r>
-          </a:p>
-          <a:p>
-            <a:r>
-              <a:rPr lang="en-US" dirty="0"/>
-              <a:t>;; element increased by the length of the </a:t>
-            </a:r>
-            <a:r>
-              <a:rPr lang="en-US" dirty="0" err="1"/>
-              <a:t>sublist</a:t>
-            </a:r>
-            <a:r>
-              <a:rPr lang="en-US" dirty="0"/>
-              <a:t> </a:t>
-            </a:r>
-          </a:p>
-          <a:p>
-            <a:r>
-              <a:rPr lang="en-US" dirty="0"/>
-              <a:t>;; starting at that element.</a:t>
-            </a:r>
-          </a:p>
-          <a:p>
-            <a:r>
-              <a:rPr lang="en-US" dirty="0"/>
-              <a:t>;; (100 300 500) =&gt; (103 302 501)</a:t>
-            </a:r>
-          </a:p>
-          <a:p>
-            <a:r>
-              <a:rPr lang="en-US" dirty="0"/>
-              <a:t>;; Strategy: Use template for </a:t>
-            </a:r>
-            <a:r>
-              <a:rPr lang="en-US" dirty="0" err="1"/>
-              <a:t>LoN</a:t>
-            </a:r>
-            <a:r>
-              <a:rPr lang="en-US" dirty="0"/>
-              <a:t> on </a:t>
-            </a:r>
-            <a:r>
-              <a:rPr lang="en-US" dirty="0" err="1"/>
-              <a:t>lst</a:t>
-            </a:r>
-            <a:endParaRPr lang="en-US" dirty="0"/>
-          </a:p>
-          <a:p>
-            <a:r>
-              <a:rPr lang="en-US" dirty="0"/>
-              <a:t>(define (add-remaining-length </a:t>
-            </a:r>
-            <a:r>
-              <a:rPr lang="en-US" dirty="0" err="1"/>
-              <a:t>lst</a:t>
-            </a:r>
-            <a:r>
-              <a:rPr lang="en-US" dirty="0"/>
-              <a:t>)</a:t>
-            </a:r>
-          </a:p>
-          <a:p>
-            <a:r>
-              <a:rPr lang="en-US" dirty="0"/>
-              <a:t>  (</a:t>
-            </a:r>
-            <a:r>
-              <a:rPr lang="en-US" dirty="0" err="1"/>
-              <a:t>cond</a:t>
-            </a:r>
-            <a:endParaRPr lang="en-US" dirty="0"/>
-          </a:p>
-          <a:p>
-            <a:r>
-              <a:rPr lang="en-US" dirty="0"/>
-              <a:t>    [(empty? </a:t>
-            </a:r>
-            <a:r>
-              <a:rPr lang="en-US" dirty="0" err="1"/>
-              <a:t>lst</a:t>
-            </a:r>
-            <a:r>
-              <a:rPr lang="en-US" dirty="0"/>
-              <a:t>) empty]</a:t>
-            </a:r>
-          </a:p>
-          <a:p>
-            <a:r>
-              <a:rPr lang="en-US" dirty="0"/>
-              <a:t>    [else (cons</a:t>
-            </a:r>
-          </a:p>
-          <a:p>
-            <a:r>
-              <a:rPr lang="en-US" dirty="0"/>
-              <a:t>            (+ (first </a:t>
-            </a:r>
-            <a:r>
-              <a:rPr lang="en-US" dirty="0" err="1"/>
-              <a:t>lst</a:t>
-            </a:r>
-            <a:r>
-              <a:rPr lang="en-US" dirty="0"/>
-              <a:t>) (length </a:t>
-            </a:r>
-            <a:r>
-              <a:rPr lang="en-US" dirty="0" err="1"/>
-              <a:t>lst</a:t>
-            </a:r>
-            <a:r>
-              <a:rPr lang="en-US" dirty="0"/>
-              <a:t>))</a:t>
-            </a:r>
-          </a:p>
-          <a:p>
-            <a:r>
-              <a:rPr lang="en-US" dirty="0"/>
-              <a:t>            (add-remaining-length </a:t>
-            </a:r>
-          </a:p>
-          <a:p>
-            <a:r>
-              <a:rPr lang="en-US" dirty="0"/>
-              <a:t>              (rest </a:t>
-            </a:r>
-            <a:r>
-              <a:rPr lang="en-US" dirty="0" err="1"/>
-              <a:t>lst</a:t>
-            </a:r>
-            <a:r>
-              <a:rPr lang="en-US" dirty="0"/>
-              <a:t>)))]))</a:t>
-            </a:r>
-          </a:p>
-        </p:txBody>
-      </p:sp>
-      <p:sp>
-        <p:nvSpPr>
-          <p:cNvPr id="3" name="Slide Number Placeholder 2"/>
-          <p:cNvSpPr>
-            <a:spLocks noGrp="1"/>
-          </p:cNvSpPr>
-          <p:nvPr>
-            <p:ph type="sldNum" sz="quarter" idx="12"/>
-          </p:nvPr>
-        </p:nvSpPr>
-        <p:spPr/>
-        <p:txBody>
-          <a:bodyPr/>
-          <a:lstStyle/>
-          <a:p>
-            <a:fld id="{4FF46DE1-096B-4EDD-A00F-DA0292705DA0}" type="slidenum">
-              <a:rPr lang="en-US" smtClean="0"/>
-              <a:t>12</a:t>
-            </a:fld>
-            <a:endParaRPr lang="en-US"/>
-          </a:p>
-        </p:txBody>
-      </p:sp>
-      <p:grpSp>
-        <p:nvGrpSpPr>
-          <p:cNvPr id="8" name="Group 7"/>
-          <p:cNvGrpSpPr/>
-          <p:nvPr/>
-        </p:nvGrpSpPr>
-        <p:grpSpPr>
-          <a:xfrm>
-            <a:off x="6058746" y="3690642"/>
-            <a:ext cx="3060304" cy="2651125"/>
-            <a:chOff x="6058746" y="3690642"/>
-            <a:chExt cx="3060304" cy="2651125"/>
-          </a:xfrm>
-        </p:grpSpPr>
-        <p:sp>
-          <p:nvSpPr>
-            <p:cNvPr id="5" name="Rectangle 4"/>
-            <p:cNvSpPr/>
-            <p:nvPr/>
-          </p:nvSpPr>
-          <p:spPr>
-            <a:xfrm>
-              <a:off x="6793264" y="3690642"/>
-              <a:ext cx="2325786" cy="2651125"/>
-            </a:xfrm>
-            <a:prstGeom prst="rect">
-              <a:avLst/>
-            </a:prstGeom>
-            <a:solidFill>
-              <a:srgbClr val="FF0000">
-                <a:alpha val="26000"/>
-              </a:srgbClr>
-            </a:solidFill>
-            <a:ln>
-              <a:noFill/>
-              <a:tailEnd type="stealth" w="lg" len="lg"/>
-            </a:ln>
-          </p:spPr>
-          <p:style>
-            <a:lnRef idx="1">
-              <a:schemeClr val="accent2"/>
-            </a:lnRef>
-            <a:fillRef idx="2">
-              <a:schemeClr val="accent2"/>
-            </a:fillRef>
-            <a:effectRef idx="1">
-              <a:schemeClr val="accent2"/>
-            </a:effectRef>
-            <a:fontRef idx="minor">
-              <a:schemeClr val="dk1"/>
-            </a:fontRef>
-          </p:style>
-          <p:txBody>
-            <a:bodyPr rot="0" spcFirstLastPara="0" vertOverflow="overflow" horzOverflow="overflow" vert="horz" wrap="square" lIns="91440" tIns="45720" rIns="91440" bIns="45720" numCol="1" spcCol="0" rtlCol="0" fromWordArt="0" anchor="ctr" anchorCtr="0" forceAA="0" compatLnSpc="1">
-              <a:prstTxWarp prst="textNoShape">
-                <a:avLst/>
-              </a:prstTxWarp>
-              <a:noAutofit/>
-            </a:bodyPr>
-            <a:lstStyle/>
-            <a:p>
-              <a:r>
-                <a:rPr lang="en-US" sz="2000" dirty="0"/>
-                <a:t>Yuck! You have to recalculate the length of list every time through (repeated computation might be slow!)</a:t>
-              </a:r>
-            </a:p>
-          </p:txBody>
-        </p:sp>
-        <p:sp>
-          <p:nvSpPr>
-            <p:cNvPr id="6" name="Freeform 5"/>
-            <p:cNvSpPr/>
-            <p:nvPr/>
-          </p:nvSpPr>
-          <p:spPr>
-            <a:xfrm>
-              <a:off x="6058746" y="3863181"/>
-              <a:ext cx="734518" cy="919265"/>
-            </a:xfrm>
-            <a:custGeom>
-              <a:avLst/>
-              <a:gdLst>
-                <a:gd name="connsiteX0" fmla="*/ 734518 w 734518"/>
-                <a:gd name="connsiteY0" fmla="*/ 124786 h 919265"/>
-                <a:gd name="connsiteX1" fmla="*/ 224853 w 734518"/>
-                <a:gd name="connsiteY1" fmla="*/ 64825 h 919265"/>
-                <a:gd name="connsiteX2" fmla="*/ 0 w 734518"/>
-                <a:gd name="connsiteY2" fmla="*/ 919265 h 919265"/>
-              </a:gdLst>
-              <a:ahLst/>
-              <a:cxnLst>
-                <a:cxn ang="0">
-                  <a:pos x="connsiteX0" y="connsiteY0"/>
-                </a:cxn>
-                <a:cxn ang="0">
-                  <a:pos x="connsiteX1" y="connsiteY1"/>
-                </a:cxn>
-                <a:cxn ang="0">
-                  <a:pos x="connsiteX2" y="connsiteY2"/>
-                </a:cxn>
-              </a:cxnLst>
-              <a:rect l="l" t="t" r="r" b="b"/>
-              <a:pathLst>
-                <a:path w="734518" h="919265">
-                  <a:moveTo>
-                    <a:pt x="734518" y="124786"/>
-                  </a:moveTo>
-                  <a:cubicBezTo>
-                    <a:pt x="540895" y="28599"/>
-                    <a:pt x="347273" y="-67588"/>
-                    <a:pt x="224853" y="64825"/>
-                  </a:cubicBezTo>
-                  <a:cubicBezTo>
-                    <a:pt x="102433" y="197238"/>
-                    <a:pt x="51216" y="558251"/>
-                    <a:pt x="0" y="919265"/>
-                  </a:cubicBezTo>
-                </a:path>
-              </a:pathLst>
-            </a:custGeom>
-            <a:noFill/>
-            <a:ln w="12700">
-              <a:solidFill>
-                <a:schemeClr val="tx1"/>
-              </a:solidFill>
-              <a:tailEnd type="stealth" w="lg" len="lg"/>
-            </a:ln>
-          </p:spPr>
-          <p:style>
-            <a:lnRef idx="1">
-              <a:schemeClr val="accent3"/>
-            </a:lnRef>
-            <a:fillRef idx="2">
-              <a:schemeClr val="accent3"/>
-            </a:fillRef>
-            <a:effectRef idx="1">
-              <a:schemeClr val="accent3"/>
-            </a:effectRef>
-            <a:fontRef idx="minor">
-              <a:schemeClr val="dk1"/>
-            </a:fontRef>
-          </p:style>
-          <p:txBody>
-            <a:bodyPr rtlCol="0" anchor="ctr"/>
-            <a:lstStyle/>
-            <a:p>
-              <a:pPr algn="ctr"/>
-              <a:endParaRPr lang="en-US"/>
-            </a:p>
-          </p:txBody>
-        </p:sp>
-      </p:grpSp>
-    </p:spTree>
-    <p:extLst>
-      <p:ext uri="{BB962C8B-B14F-4D97-AF65-F5344CB8AC3E}">
-        <p14:creationId xmlns:p14="http://schemas.microsoft.com/office/powerpoint/2010/main" val="2175540790"/>
-      </p:ext>
-    </p:extLst>
-  </p:cSld>
-  <p:clrMapOvr>
-    <a:masterClrMapping/>
-  </p:clrMapOvr>
-</p:sld>
-</file>
-
-<file path=ppt/slides/slide13.xml><?xml version="1.0" encoding="utf-8"?>
-<p:sld xmlns:a="http://schemas.openxmlformats.org/drawingml/2006/main" xmlns:r="http://schemas.openxmlformats.org/officeDocument/2006/relationships" xmlns:p="http://schemas.openxmlformats.org/presentationml/2006/main">
-  <p:cSld>
-    <p:spTree>
-      <p:nvGrpSpPr>
-        <p:cNvPr id="1" name=""/>
-        <p:cNvGrpSpPr/>
-        <p:nvPr/>
-      </p:nvGrpSpPr>
-      <p:grpSpPr>
-        <a:xfrm>
-          <a:off x="0" y="0"/>
-          <a:ext cx="0" cy="0"/>
-          <a:chOff x="0" y="0"/>
-          <a:chExt cx="0" cy="0"/>
-        </a:xfrm>
-      </p:grpSpPr>
-      <p:sp>
-        <p:nvSpPr>
-          <p:cNvPr id="2" name="Title 1"/>
-          <p:cNvSpPr>
-            <a:spLocks noGrp="1"/>
-          </p:cNvSpPr>
-          <p:nvPr>
-            <p:ph type="title"/>
-          </p:nvPr>
-        </p:nvSpPr>
-        <p:spPr/>
-        <p:txBody>
-          <a:bodyPr>
-            <a:normAutofit fontScale="90000"/>
-          </a:bodyPr>
-          <a:lstStyle/>
-          <a:p>
-            <a:r>
-              <a:rPr lang="en-US" dirty="0"/>
-              <a:t>Let's help the function along by giving it the length of the list as an argument</a:t>
-            </a:r>
-          </a:p>
-        </p:txBody>
-      </p:sp>
-      <p:sp>
-        <p:nvSpPr>
-          <p:cNvPr id="3" name="Content Placeholder 2"/>
-          <p:cNvSpPr>
-            <a:spLocks noGrp="1"/>
-          </p:cNvSpPr>
-          <p:nvPr>
-            <p:ph idx="1"/>
-          </p:nvPr>
-        </p:nvSpPr>
-        <p:spPr>
-          <a:xfrm>
-            <a:off x="457200" y="1600200"/>
-            <a:ext cx="8229600" cy="5029200"/>
-          </a:xfrm>
-        </p:spPr>
-        <p:txBody>
-          <a:bodyPr>
-            <a:noAutofit/>
-          </a:bodyPr>
-          <a:lstStyle/>
-          <a:p>
-            <a:r>
-              <a:rPr lang="en-US" sz="2000" dirty="0"/>
-              <a:t>;; add-remaining-length-1 : </a:t>
-            </a:r>
-            <a:r>
-              <a:rPr lang="en-US" sz="2000" dirty="0" err="1"/>
-              <a:t>LoN</a:t>
-            </a:r>
-            <a:r>
-              <a:rPr lang="en-US" sz="2000" dirty="0"/>
-              <a:t> Number-&gt; </a:t>
-            </a:r>
-            <a:r>
-              <a:rPr lang="en-US" sz="2000" dirty="0" err="1"/>
-              <a:t>LoN</a:t>
-            </a:r>
-            <a:endParaRPr lang="en-US" sz="2000" dirty="0"/>
-          </a:p>
-          <a:p>
-            <a:r>
-              <a:rPr lang="en-US" sz="2000" dirty="0"/>
-              <a:t>;; GIVEN: a Lon </a:t>
-            </a:r>
-            <a:r>
-              <a:rPr lang="en-US" sz="2000" dirty="0" err="1"/>
-              <a:t>lst</a:t>
-            </a:r>
-            <a:r>
-              <a:rPr lang="en-US" sz="2000" dirty="0"/>
-              <a:t> and a number n</a:t>
-            </a:r>
-          </a:p>
-          <a:p>
-            <a:r>
-              <a:rPr lang="en-US" sz="2000" dirty="0"/>
-              <a:t>;; </a:t>
-            </a:r>
-            <a:r>
-              <a:rPr lang="en-US" sz="2000" dirty="0">
-                <a:solidFill>
-                  <a:srgbClr val="FF0000"/>
-                </a:solidFill>
-              </a:rPr>
-              <a:t>WHERE: n = (length </a:t>
-            </a:r>
-            <a:r>
-              <a:rPr lang="en-US" sz="2000" dirty="0" err="1">
-                <a:solidFill>
-                  <a:srgbClr val="FF0000"/>
-                </a:solidFill>
-              </a:rPr>
-              <a:t>lst</a:t>
-            </a:r>
-            <a:r>
-              <a:rPr lang="en-US" sz="2000" dirty="0">
-                <a:solidFill>
-                  <a:srgbClr val="FF0000"/>
-                </a:solidFill>
-              </a:rPr>
-              <a:t>)</a:t>
-            </a:r>
-          </a:p>
-          <a:p>
-            <a:r>
-              <a:rPr lang="en-US" sz="2000" dirty="0"/>
-              <a:t>;; RETURNS: a list like the original, but with each</a:t>
-            </a:r>
-          </a:p>
-          <a:p>
-            <a:r>
-              <a:rPr lang="en-US" sz="2000" dirty="0"/>
-              <a:t>;; element increased by the length of the </a:t>
-            </a:r>
-            <a:r>
-              <a:rPr lang="en-US" sz="2000" dirty="0" err="1"/>
-              <a:t>sublist</a:t>
-            </a:r>
-            <a:r>
-              <a:rPr lang="en-US" sz="2000" dirty="0"/>
-              <a:t> </a:t>
-            </a:r>
-          </a:p>
-          <a:p>
-            <a:r>
-              <a:rPr lang="en-US" sz="2000" dirty="0"/>
-              <a:t>;; starting at that element.</a:t>
-            </a:r>
-          </a:p>
-          <a:p>
-            <a:r>
-              <a:rPr lang="en-US" sz="2000" dirty="0"/>
-              <a:t>;; (100 300 500) 3 =&gt; (103 302 501)</a:t>
-            </a:r>
-          </a:p>
-          <a:p>
-            <a:r>
-              <a:rPr lang="en-US" sz="2000" dirty="0"/>
-              <a:t>;; Strategy: Use template for </a:t>
-            </a:r>
-            <a:r>
-              <a:rPr lang="en-US" sz="2000" dirty="0" err="1"/>
-              <a:t>LoN</a:t>
-            </a:r>
-            <a:r>
-              <a:rPr lang="en-US" sz="2000" dirty="0"/>
-              <a:t> on </a:t>
-            </a:r>
-            <a:r>
-              <a:rPr lang="en-US" sz="2000" dirty="0" err="1"/>
-              <a:t>lst</a:t>
-            </a:r>
-            <a:endParaRPr lang="en-US" sz="2000" dirty="0"/>
-          </a:p>
-          <a:p>
-            <a:r>
-              <a:rPr lang="en-US" sz="2000" dirty="0"/>
-              <a:t>(define (add-remaining-length-1 </a:t>
-            </a:r>
-            <a:r>
-              <a:rPr lang="en-US" sz="2000" dirty="0" err="1"/>
-              <a:t>lst</a:t>
-            </a:r>
-            <a:r>
-              <a:rPr lang="en-US" sz="2000" dirty="0"/>
-              <a:t> n)</a:t>
-            </a:r>
-          </a:p>
-          <a:p>
-            <a:r>
-              <a:rPr lang="en-US" sz="2000" dirty="0"/>
-              <a:t>  (</a:t>
-            </a:r>
-            <a:r>
-              <a:rPr lang="en-US" sz="2000" dirty="0" err="1"/>
-              <a:t>cond</a:t>
-            </a:r>
-            <a:r>
-              <a:rPr lang="en-US" sz="2000" dirty="0"/>
-              <a:t> [(empty? </a:t>
-            </a:r>
-            <a:r>
-              <a:rPr lang="en-US" sz="2000" dirty="0" err="1"/>
-              <a:t>lst</a:t>
-            </a:r>
-            <a:r>
-              <a:rPr lang="en-US" sz="2000" dirty="0"/>
-              <a:t>) empty]</a:t>
-            </a:r>
-          </a:p>
-          <a:p>
-            <a:r>
-              <a:rPr lang="en-US" sz="2000" dirty="0"/>
-              <a:t>        [else (cons</a:t>
-            </a:r>
-          </a:p>
-          <a:p>
-            <a:r>
-              <a:rPr lang="en-US" sz="2000" dirty="0"/>
-              <a:t>               (+ (first </a:t>
-            </a:r>
-            <a:r>
-              <a:rPr lang="en-US" sz="2000" dirty="0" err="1"/>
-              <a:t>lst</a:t>
-            </a:r>
-            <a:r>
-              <a:rPr lang="en-US" sz="2000" dirty="0"/>
-              <a:t>) n)</a:t>
-            </a:r>
-          </a:p>
-          <a:p>
-            <a:r>
-              <a:rPr lang="en-US" sz="2000" dirty="0"/>
-              <a:t>               (add-remaining-length-1 (rest </a:t>
-            </a:r>
-            <a:r>
-              <a:rPr lang="en-US" sz="2000" dirty="0" err="1"/>
-              <a:t>lst</a:t>
-            </a:r>
-            <a:r>
-              <a:rPr lang="en-US" sz="2000" dirty="0"/>
-              <a:t>) </a:t>
-            </a:r>
-          </a:p>
-          <a:p>
-            <a:r>
-              <a:rPr lang="en-US" sz="2000" dirty="0"/>
-              <a:t>                                       (- n 1)))]))</a:t>
-            </a:r>
-          </a:p>
-          <a:p>
-            <a:endParaRPr lang="en-US" sz="2100" dirty="0"/>
-          </a:p>
-        </p:txBody>
-      </p:sp>
-      <p:sp>
-        <p:nvSpPr>
-          <p:cNvPr id="5" name="Slide Number Placeholder 4"/>
-          <p:cNvSpPr>
-            <a:spLocks noGrp="1"/>
-          </p:cNvSpPr>
-          <p:nvPr>
-            <p:ph type="sldNum" sz="quarter" idx="12"/>
-          </p:nvPr>
-        </p:nvSpPr>
-        <p:spPr/>
-        <p:txBody>
-          <a:bodyPr/>
-          <a:lstStyle/>
-          <a:p>
-            <a:fld id="{4FF46DE1-096B-4EDD-A00F-DA0292705DA0}" type="slidenum">
-              <a:rPr lang="en-US" smtClean="0"/>
-              <a:t>13</a:t>
-            </a:fld>
-            <a:endParaRPr lang="en-US"/>
-          </a:p>
-        </p:txBody>
-      </p:sp>
-      <p:sp>
-        <p:nvSpPr>
-          <p:cNvPr id="4" name="Rectangle 3"/>
-          <p:cNvSpPr/>
-          <p:nvPr/>
-        </p:nvSpPr>
-        <p:spPr>
-          <a:xfrm>
-            <a:off x="6172200" y="4648200"/>
-            <a:ext cx="2667000" cy="1219200"/>
-          </a:xfrm>
-          <a:prstGeom prst="rect">
-            <a:avLst/>
-          </a:prstGeom>
-          <a:solidFill>
-            <a:schemeClr val="accent2">
-              <a:lumMod val="40000"/>
-              <a:lumOff val="60000"/>
-            </a:schemeClr>
-          </a:solidFill>
-          <a:ln>
-            <a:noFill/>
-            <a:tailEnd type="stealth" w="lg" len="lg"/>
-          </a:ln>
-        </p:spPr>
-        <p:style>
-          <a:lnRef idx="1">
-            <a:schemeClr val="accent2"/>
-          </a:lnRef>
-          <a:fillRef idx="2">
-            <a:schemeClr val="accent2"/>
-          </a:fillRef>
-          <a:effectRef idx="1">
-            <a:schemeClr val="accent2"/>
-          </a:effectRef>
-          <a:fontRef idx="minor">
-            <a:schemeClr val="dk1"/>
-          </a:fontRef>
-        </p:style>
-        <p:txBody>
-          <a:bodyPr rot="0" spcFirstLastPara="0" vertOverflow="overflow" horzOverflow="overflow" vert="horz" wrap="square" lIns="91440" tIns="45720" rIns="91440" bIns="45720" numCol="1" spcCol="0" rtlCol="0" fromWordArt="0" anchor="ctr" anchorCtr="0" forceAA="0" compatLnSpc="1">
-            <a:prstTxWarp prst="textNoShape">
-              <a:avLst/>
-            </a:prstTxWarp>
-            <a:noAutofit/>
-          </a:bodyPr>
-          <a:lstStyle/>
-          <a:p>
-            <a:pPr algn="ctr"/>
-            <a:r>
-              <a:rPr lang="en-US" sz="2400" dirty="0"/>
-              <a:t>Doesn't give the right answer unless invariant is satisfied </a:t>
-            </a:r>
-          </a:p>
-        </p:txBody>
-      </p:sp>
-    </p:spTree>
-    <p:extLst>
-      <p:ext uri="{BB962C8B-B14F-4D97-AF65-F5344CB8AC3E}">
-        <p14:creationId xmlns:p14="http://schemas.microsoft.com/office/powerpoint/2010/main" val="1875083326"/>
-      </p:ext>
-    </p:extLst>
-  </p:cSld>
-  <p:clrMapOvr>
-    <a:masterClrMapping/>
-  </p:clrMapOvr>
-</p:sld>
-</file>
-
-<file path=ppt/slides/slide14.xml><?xml version="1.0" encoding="utf-8"?>
-<p:sld xmlns:a="http://schemas.openxmlformats.org/drawingml/2006/main" xmlns:r="http://schemas.openxmlformats.org/officeDocument/2006/relationships" xmlns:p="http://schemas.openxmlformats.org/presentationml/2006/main">
-  <p:cSld>
-    <p:spTree>
-      <p:nvGrpSpPr>
-        <p:cNvPr id="1" name=""/>
-        <p:cNvGrpSpPr/>
-        <p:nvPr/>
-      </p:nvGrpSpPr>
-      <p:grpSpPr>
-        <a:xfrm>
-          <a:off x="0" y="0"/>
-          <a:ext cx="0" cy="0"/>
-          <a:chOff x="0" y="0"/>
-          <a:chExt cx="0" cy="0"/>
-        </a:xfrm>
-      </p:grpSpPr>
-      <p:sp>
-        <p:nvSpPr>
-          <p:cNvPr id="2" name="Title 1"/>
-          <p:cNvSpPr>
-            <a:spLocks noGrp="1"/>
-          </p:cNvSpPr>
-          <p:nvPr>
-            <p:ph type="title"/>
-          </p:nvPr>
-        </p:nvSpPr>
-        <p:spPr/>
-        <p:txBody>
-          <a:bodyPr>
-            <a:normAutofit fontScale="90000"/>
-          </a:bodyPr>
-          <a:lstStyle/>
-          <a:p>
-            <a:r>
-              <a:rPr lang="en-US" dirty="0"/>
-              <a:t>Recapture the original function by initializing the invariant</a:t>
-            </a:r>
-          </a:p>
-        </p:txBody>
-      </p:sp>
-      <p:sp>
-        <p:nvSpPr>
-          <p:cNvPr id="3" name="Content Placeholder 2"/>
-          <p:cNvSpPr>
-            <a:spLocks noGrp="1"/>
-          </p:cNvSpPr>
-          <p:nvPr>
-            <p:ph idx="1"/>
-          </p:nvPr>
-        </p:nvSpPr>
-        <p:spPr/>
-        <p:txBody>
-          <a:bodyPr>
-            <a:normAutofit fontScale="77500" lnSpcReduction="20000"/>
-          </a:bodyPr>
-          <a:lstStyle/>
-          <a:p>
-            <a:r>
-              <a:rPr lang="en-US" dirty="0"/>
-              <a:t>;; add-remaining-length-version-2 : </a:t>
-            </a:r>
-            <a:r>
-              <a:rPr lang="en-US" dirty="0" err="1"/>
-              <a:t>LoN</a:t>
-            </a:r>
-            <a:r>
-              <a:rPr lang="en-US" dirty="0"/>
-              <a:t> -&gt; </a:t>
-            </a:r>
-            <a:r>
-              <a:rPr lang="en-US" dirty="0" err="1"/>
-              <a:t>LoN</a:t>
-            </a:r>
-            <a:endParaRPr lang="en-US" dirty="0"/>
-          </a:p>
-          <a:p>
-            <a:r>
-              <a:rPr lang="en-US" dirty="0"/>
-              <a:t>;; GIVEN: a Lon </a:t>
-            </a:r>
-            <a:r>
-              <a:rPr lang="en-US" dirty="0" err="1"/>
-              <a:t>lst</a:t>
-            </a:r>
-            <a:endParaRPr lang="en-US" dirty="0"/>
-          </a:p>
-          <a:p>
-            <a:r>
-              <a:rPr lang="en-US" dirty="0"/>
-              <a:t>;; RETURNS: a list like the original, </a:t>
-            </a:r>
-          </a:p>
-          <a:p>
-            <a:r>
-              <a:rPr lang="en-US" dirty="0"/>
-              <a:t>;;  but with each element increased by the</a:t>
-            </a:r>
-          </a:p>
-          <a:p>
-            <a:r>
-              <a:rPr lang="en-US" dirty="0"/>
-              <a:t>;;  length of the </a:t>
-            </a:r>
-            <a:r>
-              <a:rPr lang="en-US" dirty="0" err="1"/>
-              <a:t>sublist</a:t>
-            </a:r>
-            <a:r>
-              <a:rPr lang="en-US" dirty="0"/>
-              <a:t> starting at that</a:t>
-            </a:r>
-          </a:p>
-          <a:p>
-            <a:r>
-              <a:rPr lang="en-US" dirty="0"/>
-              <a:t>;;  element.</a:t>
-            </a:r>
-          </a:p>
-          <a:p>
-            <a:r>
-              <a:rPr lang="en-US" dirty="0"/>
-              <a:t>;; (100 300 500) =&gt; (103 302 501)</a:t>
-            </a:r>
-          </a:p>
-          <a:p>
-            <a:r>
-              <a:rPr lang="en-US" dirty="0"/>
-              <a:t>;; STRATEGY: Initialize the invariant </a:t>
-            </a:r>
-          </a:p>
-          <a:p>
-            <a:r>
-              <a:rPr lang="en-US" dirty="0"/>
-              <a:t>;;           of add-remaining-length-1</a:t>
-            </a:r>
-          </a:p>
-          <a:p>
-            <a:r>
-              <a:rPr lang="en-US" dirty="0"/>
-              <a:t>(define (add-remaining-length-version-2 </a:t>
-            </a:r>
-            <a:r>
-              <a:rPr lang="en-US" dirty="0" err="1"/>
-              <a:t>lst</a:t>
-            </a:r>
-            <a:r>
-              <a:rPr lang="en-US" dirty="0"/>
-              <a:t>)</a:t>
-            </a:r>
-          </a:p>
-          <a:p>
-            <a:r>
-              <a:rPr lang="en-US" dirty="0"/>
-              <a:t>  (add-remaining-length-1 </a:t>
-            </a:r>
-            <a:r>
-              <a:rPr lang="en-US" dirty="0" err="1"/>
-              <a:t>lst</a:t>
-            </a:r>
-            <a:r>
-              <a:rPr lang="en-US" dirty="0"/>
-              <a:t> (length </a:t>
-            </a:r>
-            <a:r>
-              <a:rPr lang="en-US" dirty="0" err="1"/>
-              <a:t>lst</a:t>
-            </a:r>
-            <a:r>
-              <a:rPr lang="en-US" dirty="0"/>
-              <a:t>)))</a:t>
-            </a:r>
-          </a:p>
-        </p:txBody>
-      </p:sp>
-      <p:sp>
-        <p:nvSpPr>
-          <p:cNvPr id="4" name="Slide Number Placeholder 3"/>
-          <p:cNvSpPr>
-            <a:spLocks noGrp="1"/>
-          </p:cNvSpPr>
-          <p:nvPr>
-            <p:ph type="sldNum" sz="quarter" idx="12"/>
-          </p:nvPr>
-        </p:nvSpPr>
-        <p:spPr/>
-        <p:txBody>
-          <a:bodyPr/>
-          <a:lstStyle/>
-          <a:p>
-            <a:fld id="{2AF3B5EA-18B6-4040-9F78-6052AF49C681}" type="slidenum">
-              <a:rPr lang="en-US" smtClean="0"/>
-              <a:t>14</a:t>
-            </a:fld>
-            <a:endParaRPr lang="en-US"/>
-          </a:p>
-        </p:txBody>
-      </p:sp>
-    </p:spTree>
-    <p:extLst>
-      <p:ext uri="{BB962C8B-B14F-4D97-AF65-F5344CB8AC3E}">
-        <p14:creationId xmlns:p14="http://schemas.microsoft.com/office/powerpoint/2010/main" val="2985539736"/>
-      </p:ext>
-    </p:extLst>
-  </p:cSld>
-  <p:clrMapOvr>
-    <a:masterClrMapping/>
-  </p:clrMapOvr>
-</p:sld>
-</file>
-
-<file path=ppt/slides/slide15.xml><?xml version="1.0" encoding="utf-8"?>
-<p:sld xmlns:a="http://schemas.openxmlformats.org/drawingml/2006/main" xmlns:r="http://schemas.openxmlformats.org/officeDocument/2006/relationships" xmlns:p="http://schemas.openxmlformats.org/presentationml/2006/main">
-  <p:cSld>
-    <p:spTree>
-      <p:nvGrpSpPr>
-        <p:cNvPr id="1" name=""/>
-        <p:cNvGrpSpPr/>
-        <p:nvPr/>
-      </p:nvGrpSpPr>
-      <p:grpSpPr>
-        <a:xfrm>
-          <a:off x="0" y="0"/>
-          <a:ext cx="0" cy="0"/>
-          <a:chOff x="0" y="0"/>
-          <a:chExt cx="0" cy="0"/>
-        </a:xfrm>
-      </p:grpSpPr>
-      <p:sp>
-        <p:nvSpPr>
-          <p:cNvPr id="2" name="Title 1"/>
-          <p:cNvSpPr>
-            <a:spLocks noGrp="1"/>
-          </p:cNvSpPr>
-          <p:nvPr>
-            <p:ph type="title"/>
-          </p:nvPr>
-        </p:nvSpPr>
-        <p:spPr/>
-        <p:txBody>
-          <a:bodyPr>
-            <a:normAutofit fontScale="90000"/>
-          </a:bodyPr>
-          <a:lstStyle/>
-          <a:p>
-            <a:r>
-              <a:rPr lang="en-US" dirty="0"/>
-              <a:t>Summary: When do I need an invariant? </a:t>
-            </a:r>
-          </a:p>
-        </p:txBody>
-      </p:sp>
-      <p:sp>
-        <p:nvSpPr>
-          <p:cNvPr id="3" name="Content Placeholder 2"/>
-          <p:cNvSpPr>
-            <a:spLocks noGrp="1"/>
-          </p:cNvSpPr>
-          <p:nvPr>
-            <p:ph idx="1"/>
-          </p:nvPr>
-        </p:nvSpPr>
-        <p:spPr/>
-        <p:txBody>
-          <a:bodyPr/>
-          <a:lstStyle/>
-          <a:p>
-            <a:r>
-              <a:rPr lang="en-US" dirty="0"/>
-              <a:t>It all depends on your purpose statement!</a:t>
-            </a:r>
-          </a:p>
-          <a:p>
-            <a:r>
-              <a:rPr lang="en-US" dirty="0"/>
-              <a:t>If the function needs additional information to fulfill its stated purpose, and that information is not in the arguments, then you need an invariant to document the needed information.</a:t>
-            </a:r>
-          </a:p>
-          <a:p>
-            <a:r>
-              <a:rPr lang="en-US" dirty="0"/>
-              <a:t>It is up to each caller of the function to make sure that the invariant is true at every call.</a:t>
-            </a:r>
-          </a:p>
-          <a:p>
-            <a:endParaRPr lang="en-US" dirty="0"/>
-          </a:p>
-        </p:txBody>
-      </p:sp>
-      <p:sp>
-        <p:nvSpPr>
-          <p:cNvPr id="4" name="Slide Number Placeholder 3"/>
-          <p:cNvSpPr>
-            <a:spLocks noGrp="1"/>
-          </p:cNvSpPr>
-          <p:nvPr>
-            <p:ph type="sldNum" sz="quarter" idx="12"/>
-          </p:nvPr>
-        </p:nvSpPr>
-        <p:spPr/>
-        <p:txBody>
-          <a:bodyPr/>
-          <a:lstStyle/>
-          <a:p>
-            <a:fld id="{4FF46DE1-096B-4EDD-A00F-DA0292705DA0}" type="slidenum">
-              <a:rPr lang="en-US" smtClean="0"/>
-              <a:t>15</a:t>
-            </a:fld>
-            <a:endParaRPr lang="en-US"/>
-          </a:p>
-        </p:txBody>
-      </p:sp>
-    </p:spTree>
-    <p:extLst>
-      <p:ext uri="{BB962C8B-B14F-4D97-AF65-F5344CB8AC3E}">
-        <p14:creationId xmlns:p14="http://schemas.microsoft.com/office/powerpoint/2010/main" val="2810350204"/>
-      </p:ext>
-    </p:extLst>
-  </p:cSld>
-  <p:clrMapOvr>
-    <a:masterClrMapping/>
-  </p:clrMapOvr>
-</p:sld>
-</file>
-
-<file path=ppt/slides/slide16.xml><?xml version="1.0" encoding="utf-8"?>
-<p:sld xmlns:a="http://schemas.openxmlformats.org/drawingml/2006/main" xmlns:r="http://schemas.openxmlformats.org/officeDocument/2006/relationships" xmlns:p="http://schemas.openxmlformats.org/presentationml/2006/main">
-  <p:cSld>
-    <p:spTree>
-      <p:nvGrpSpPr>
-        <p:cNvPr id="1" name=""/>
-        <p:cNvGrpSpPr/>
-        <p:nvPr/>
-      </p:nvGrpSpPr>
-      <p:grpSpPr>
-        <a:xfrm>
-          <a:off x="0" y="0"/>
-          <a:ext cx="0" cy="0"/>
-          <a:chOff x="0" y="0"/>
-          <a:chExt cx="0" cy="0"/>
-        </a:xfrm>
-      </p:grpSpPr>
-      <p:sp>
-        <p:nvSpPr>
-          <p:cNvPr id="2" name="Title 1"/>
-          <p:cNvSpPr>
-            <a:spLocks noGrp="1"/>
-          </p:cNvSpPr>
-          <p:nvPr>
-            <p:ph type="title"/>
-          </p:nvPr>
-        </p:nvSpPr>
-        <p:spPr/>
-        <p:txBody>
-          <a:bodyPr/>
-          <a:lstStyle/>
-          <a:p>
-            <a:r>
-              <a:rPr lang="en-US" dirty="0"/>
-              <a:t>Summary</a:t>
-            </a:r>
-          </a:p>
-        </p:txBody>
-      </p:sp>
-      <p:sp>
-        <p:nvSpPr>
-          <p:cNvPr id="3" name="Content Placeholder 2"/>
-          <p:cNvSpPr>
-            <a:spLocks noGrp="1"/>
-          </p:cNvSpPr>
-          <p:nvPr>
-            <p:ph idx="1"/>
-          </p:nvPr>
-        </p:nvSpPr>
-        <p:spPr/>
-        <p:txBody>
-          <a:bodyPr/>
-          <a:lstStyle/>
-          <a:p>
-            <a:r>
-              <a:rPr lang="en-US" dirty="0"/>
-              <a:t>The student should now be able to</a:t>
-            </a:r>
-          </a:p>
-          <a:p>
-            <a:pPr lvl="1"/>
-            <a:r>
-              <a:rPr lang="en-US" dirty="0"/>
-              <a:t>decide whether a purpose statement needs an invariant or not.</a:t>
-            </a:r>
-          </a:p>
-          <a:p>
-            <a:endParaRPr lang="en-US" dirty="0"/>
-          </a:p>
-        </p:txBody>
-      </p:sp>
-      <p:sp>
-        <p:nvSpPr>
-          <p:cNvPr id="4" name="Slide Number Placeholder 3"/>
-          <p:cNvSpPr>
-            <a:spLocks noGrp="1"/>
-          </p:cNvSpPr>
-          <p:nvPr>
-            <p:ph type="sldNum" sz="quarter" idx="12"/>
-          </p:nvPr>
-        </p:nvSpPr>
-        <p:spPr/>
-        <p:txBody>
-          <a:bodyPr/>
-          <a:lstStyle/>
-          <a:p>
-            <a:fld id="{4FF46DE1-096B-4EDD-A00F-DA0292705DA0}" type="slidenum">
-              <a:rPr lang="en-US" smtClean="0"/>
-              <a:t>16</a:t>
-            </a:fld>
-            <a:endParaRPr lang="en-US"/>
-          </a:p>
-        </p:txBody>
-      </p:sp>
-    </p:spTree>
-    <p:extLst>
-      <p:ext uri="{BB962C8B-B14F-4D97-AF65-F5344CB8AC3E}">
-        <p14:creationId xmlns:p14="http://schemas.microsoft.com/office/powerpoint/2010/main" val="1310055986"/>
-      </p:ext>
-    </p:extLst>
-  </p:cSld>
-  <p:clrMapOvr>
-    <a:masterClrMapping/>
-  </p:clrMapOvr>
-</p:sld>
-</file>
-
-<file path=ppt/slides/slide17.xml><?xml version="1.0" encoding="utf-8"?>
-<p:sld xmlns:a="http://schemas.openxmlformats.org/drawingml/2006/main" xmlns:r="http://schemas.openxmlformats.org/officeDocument/2006/relationships" xmlns:p="http://schemas.openxmlformats.org/presentationml/2006/main">
-  <p:cSld>
-    <p:spTree>
-      <p:nvGrpSpPr>
-        <p:cNvPr id="1" name=""/>
-        <p:cNvGrpSpPr/>
-        <p:nvPr/>
-      </p:nvGrpSpPr>
-      <p:grpSpPr>
-        <a:xfrm>
-          <a:off x="0" y="0"/>
-          <a:ext cx="0" cy="0"/>
-          <a:chOff x="0" y="0"/>
-          <a:chExt cx="0" cy="0"/>
-        </a:xfrm>
-      </p:grpSpPr>
-      <p:sp>
-        <p:nvSpPr>
-          <p:cNvPr id="2" name="Title 1"/>
-          <p:cNvSpPr>
-            <a:spLocks noGrp="1"/>
-          </p:cNvSpPr>
-          <p:nvPr>
-            <p:ph type="title"/>
-          </p:nvPr>
-        </p:nvSpPr>
-        <p:spPr/>
-        <p:txBody>
-          <a:bodyPr/>
-          <a:lstStyle/>
-          <a:p>
-            <a:r>
-              <a:rPr lang="en-US" dirty="0"/>
-              <a:t>Next Steps</a:t>
-            </a:r>
-          </a:p>
-        </p:txBody>
-      </p:sp>
-      <p:sp>
-        <p:nvSpPr>
-          <p:cNvPr id="3" name="Content Placeholder 2"/>
-          <p:cNvSpPr>
-            <a:spLocks noGrp="1"/>
-          </p:cNvSpPr>
-          <p:nvPr>
-            <p:ph idx="1"/>
-          </p:nvPr>
-        </p:nvSpPr>
-        <p:spPr/>
-        <p:txBody>
-          <a:bodyPr/>
-          <a:lstStyle/>
-          <a:p>
-            <a:r>
-              <a:rPr lang="en-US" dirty="0"/>
-              <a:t>If you have questions about this lesson, ask them on the Discussion Board</a:t>
-            </a:r>
-          </a:p>
-          <a:p>
-            <a:r>
-              <a:rPr lang="en-US" dirty="0"/>
-              <a:t>Look </a:t>
-            </a:r>
-            <a:r>
-              <a:rPr lang="en-US"/>
-              <a:t>at 07-3-invariants.rkt </a:t>
-            </a:r>
-            <a:r>
-              <a:rPr lang="en-US" dirty="0"/>
-              <a:t>in the Exam</a:t>
-            </a:r>
-          </a:p>
-          <a:p>
-            <a:r>
-              <a:rPr lang="en-US" dirty="0"/>
-              <a:t>Go on to the next lesson</a:t>
-            </a:r>
-          </a:p>
-        </p:txBody>
-      </p:sp>
-      <p:sp>
-        <p:nvSpPr>
-          <p:cNvPr id="4" name="Slide Number Placeholder 3"/>
-          <p:cNvSpPr>
-            <a:spLocks noGrp="1"/>
-          </p:cNvSpPr>
-          <p:nvPr>
-            <p:ph type="sldNum" sz="quarter" idx="12"/>
-          </p:nvPr>
-        </p:nvSpPr>
-        <p:spPr/>
-        <p:txBody>
-          <a:bodyPr/>
-          <a:lstStyle/>
-          <a:p>
-            <a:fld id="{4FF46DE1-096B-4EDD-A00F-DA0292705DA0}" type="slidenum">
-              <a:rPr lang="en-US" smtClean="0"/>
-              <a:t>17</a:t>
             </a:fld>
             <a:endParaRPr lang="en-US"/>
           </a:p>
@@ -7220,12 +5898,14 @@
         </p:nvSpPr>
         <p:spPr/>
         <p:txBody>
-          <a:bodyPr/>
+          <a:bodyPr>
+            <a:normAutofit fontScale="90000"/>
+          </a:bodyPr>
           <a:lstStyle/>
           <a:p>
             <a:r>
               <a:rPr lang="en-US" dirty="0"/>
-              <a:t>Example</a:t>
+              <a:t>Once more: When do I need an invariant?</a:t>
             </a:r>
           </a:p>
         </p:txBody>
@@ -7240,174 +5920,30 @@
             <p:ph idx="1"/>
           </p:nvPr>
         </p:nvSpPr>
-        <p:spPr>
-          <a:xfrm>
-            <a:off x="457200" y="1600200"/>
-            <a:ext cx="8686800" cy="4525963"/>
-          </a:xfrm>
-        </p:spPr>
-        <p:txBody>
-          <a:bodyPr>
-            <a:normAutofit fontScale="62500" lnSpcReduction="20000"/>
-          </a:bodyPr>
+        <p:spPr/>
+        <p:txBody>
+          <a:bodyPr/>
           <a:lstStyle/>
           <a:p>
             <a:r>
               <a:rPr lang="en-US" dirty="0"/>
-              <a:t>;; number-list-from : </a:t>
-            </a:r>
-            <a:r>
-              <a:rPr lang="en-US" dirty="0" err="1"/>
-              <a:t>ListOfX</a:t>
-            </a:r>
+              <a:t>If your code fulfills the purpose statement for any arguments of the types listed in the contract, you don't need an invariant.</a:t>
+            </a:r>
+          </a:p>
+          <a:p>
             <a:r>
               <a:rPr lang="en-US" dirty="0"/>
-              <a:t> Number -&gt; </a:t>
-            </a:r>
-            <a:r>
-              <a:rPr lang="en-US" dirty="0" err="1"/>
-              <a:t>NumberedListOfX</a:t>
-            </a:r>
+              <a:t>If the function only works for certain values or combinations of values of the arguments, then you must document the assumptions that it needs with a WHERE-clause (i.e. an invariant).</a:t>
+            </a:r>
+          </a:p>
+          <a:p>
             <a:endParaRPr lang="en-US" dirty="0"/>
           </a:p>
-          <a:p>
-            <a:r>
-              <a:rPr lang="en-US" dirty="0"/>
-              <a:t>;; RETURNS: a list with same elements as </a:t>
-            </a:r>
-            <a:r>
-              <a:rPr lang="en-US" dirty="0" err="1"/>
-              <a:t>lst</a:t>
-            </a:r>
-            <a:r>
-              <a:rPr lang="en-US" dirty="0"/>
-              <a:t>, but numbered</a:t>
-            </a:r>
-          </a:p>
-          <a:p>
-            <a:r>
-              <a:rPr lang="en-US" dirty="0"/>
-              <a:t>;;  starting at n.</a:t>
-            </a:r>
-          </a:p>
-          <a:p>
-            <a:r>
-              <a:rPr lang="en-US" dirty="0"/>
-              <a:t>;; EXAMPLE: (number-list-from (list 88 77) 2) </a:t>
-            </a:r>
-          </a:p>
-          <a:p>
-            <a:r>
-              <a:rPr lang="en-US" dirty="0"/>
-              <a:t>;;          = (list (list 2 88) (list 3 77))</a:t>
-            </a:r>
-          </a:p>
-          <a:p>
-            <a:r>
-              <a:rPr lang="en-US" dirty="0"/>
-              <a:t>;; STRATEGY: Use template for </a:t>
-            </a:r>
-            <a:r>
-              <a:rPr lang="en-US" dirty="0" err="1"/>
-              <a:t>ListOfX</a:t>
-            </a:r>
-            <a:r>
-              <a:rPr lang="en-US" dirty="0"/>
-              <a:t> on </a:t>
-            </a:r>
-            <a:r>
-              <a:rPr lang="en-US" dirty="0" err="1"/>
-              <a:t>lst</a:t>
-            </a:r>
-            <a:endParaRPr lang="en-US" dirty="0"/>
-          </a:p>
-          <a:p>
-            <a:r>
-              <a:rPr lang="en-US" dirty="0"/>
-              <a:t>(define (number-list-from </a:t>
-            </a:r>
-            <a:r>
-              <a:rPr lang="en-US" dirty="0" err="1"/>
-              <a:t>lst</a:t>
-            </a:r>
-            <a:r>
-              <a:rPr lang="en-US" dirty="0"/>
-              <a:t> n)</a:t>
-            </a:r>
-          </a:p>
-          <a:p>
-            <a:r>
-              <a:rPr lang="en-US" dirty="0"/>
-              <a:t>  (</a:t>
-            </a:r>
-            <a:r>
-              <a:rPr lang="en-US" dirty="0" err="1"/>
-              <a:t>cond</a:t>
-            </a:r>
-            <a:endParaRPr lang="en-US" dirty="0"/>
-          </a:p>
-          <a:p>
-            <a:r>
-              <a:rPr lang="en-US" dirty="0"/>
-              <a:t>    [(empty? </a:t>
-            </a:r>
-            <a:r>
-              <a:rPr lang="en-US" dirty="0" err="1"/>
-              <a:t>lst</a:t>
-            </a:r>
-            <a:r>
-              <a:rPr lang="en-US" dirty="0"/>
-              <a:t>) empty]</a:t>
-            </a:r>
-          </a:p>
-          <a:p>
-            <a:r>
-              <a:rPr lang="en-US" dirty="0"/>
-              <a:t>    [else</a:t>
-            </a:r>
-          </a:p>
-          <a:p>
-            <a:r>
-              <a:rPr lang="en-US" dirty="0"/>
-              <a:t>      (cons</a:t>
-            </a:r>
-          </a:p>
-          <a:p>
-            <a:r>
-              <a:rPr lang="en-US" dirty="0"/>
-              <a:t>        (list n (first </a:t>
-            </a:r>
-            <a:r>
-              <a:rPr lang="en-US" dirty="0" err="1"/>
-              <a:t>lst</a:t>
-            </a:r>
-            <a:r>
-              <a:rPr lang="en-US" dirty="0"/>
-              <a:t>))</a:t>
-            </a:r>
-          </a:p>
-          <a:p>
-            <a:r>
-              <a:rPr lang="en-US" dirty="0"/>
-              <a:t>        (number-list-from (rest </a:t>
-            </a:r>
-            <a:r>
-              <a:rPr lang="en-US" dirty="0" err="1"/>
-              <a:t>lst</a:t>
-            </a:r>
-            <a:r>
-              <a:rPr lang="en-US" dirty="0"/>
-              <a:t>) (+ n 1)))]))</a:t>
-            </a:r>
-          </a:p>
-          <a:p>
-            <a:endParaRPr lang="en-US" dirty="0"/>
-          </a:p>
-        </p:txBody>
-      </p:sp>
-      <p:sp>
-        <p:nvSpPr>
-          <p:cNvPr id="5" name="Slide Number Placeholder 4"/>
+        </p:txBody>
+      </p:sp>
+      <p:sp>
+        <p:nvSpPr>
+          <p:cNvPr id="4" name="Slide Number Placeholder 3"/>
           <p:cNvSpPr>
             <a:spLocks noGrp="1"/>
           </p:cNvSpPr>
@@ -7428,149 +5964,16 @@
           </a:p>
         </p:txBody>
       </p:sp>
-      <p:sp>
-        <p:nvSpPr>
-          <p:cNvPr id="4" name="Rectangle 3"/>
-          <p:cNvSpPr/>
-          <p:nvPr/>
-        </p:nvSpPr>
-        <p:spPr>
-          <a:xfrm>
-            <a:off x="5181600" y="5639412"/>
-            <a:ext cx="3810000" cy="1143000"/>
-          </a:xfrm>
-          <a:prstGeom prst="rect">
-            <a:avLst/>
-          </a:prstGeom>
-          <a:solidFill>
-            <a:schemeClr val="accent3">
-              <a:lumMod val="40000"/>
-              <a:lumOff val="60000"/>
-            </a:schemeClr>
-          </a:solidFill>
-        </p:spPr>
-        <p:style>
-          <a:lnRef idx="1">
-            <a:schemeClr val="accent3"/>
-          </a:lnRef>
-          <a:fillRef idx="2">
-            <a:schemeClr val="accent3"/>
-          </a:fillRef>
-          <a:effectRef idx="1">
-            <a:schemeClr val="accent3"/>
-          </a:effectRef>
-          <a:fontRef idx="minor">
-            <a:schemeClr val="dk1"/>
-          </a:fontRef>
-        </p:style>
-        <p:txBody>
-          <a:bodyPr rtlCol="0" anchor="ctr"/>
-          <a:lstStyle/>
-          <a:p>
-            <a:pPr algn="ctr"/>
-            <a:r>
-              <a:rPr lang="en-US" sz="2400" dirty="0"/>
-              <a:t>Satisfies its purpose statement for any </a:t>
-            </a:r>
-            <a:r>
-              <a:rPr lang="en-US" sz="2400" dirty="0" err="1"/>
-              <a:t>lst</a:t>
-            </a:r>
-            <a:r>
-              <a:rPr lang="en-US" sz="2400" dirty="0"/>
-              <a:t> and n, so no invariant necessary. </a:t>
-            </a:r>
-          </a:p>
-        </p:txBody>
-      </p:sp>
     </p:spTree>
     <p:extLst>
       <p:ext uri="{BB962C8B-B14F-4D97-AF65-F5344CB8AC3E}">
-        <p14:creationId xmlns:p14="http://schemas.microsoft.com/office/powerpoint/2010/main" val="2531614715"/>
+        <p14:creationId xmlns:p14="http://schemas.microsoft.com/office/powerpoint/2010/main" val="2189872519"/>
       </p:ext>
     </p:extLst>
   </p:cSld>
   <p:clrMapOvr>
     <a:masterClrMapping/>
   </p:clrMapOvr>
-  <p:timing>
-    <p:tnLst>
-      <p:par>
-        <p:cTn id="1" dur="indefinite" restart="never" nodeType="tmRoot">
-          <p:childTnLst>
-            <p:seq concurrent="1" nextAc="seek">
-              <p:cTn id="2" dur="indefinite" nodeType="mainSeq">
-                <p:childTnLst>
-                  <p:par>
-                    <p:cTn id="3" fill="hold">
-                      <p:stCondLst>
-                        <p:cond delay="indefinite"/>
-                      </p:stCondLst>
-                      <p:childTnLst>
-                        <p:par>
-                          <p:cTn id="4" fill="hold">
-                            <p:stCondLst>
-                              <p:cond delay="0"/>
-                            </p:stCondLst>
-                            <p:childTnLst>
-                              <p:par>
-                                <p:cTn id="5" presetID="1" presetClass="entr" presetSubtype="0" fill="hold" grpId="0" nodeType="clickEffect">
-                                  <p:stCondLst>
-                                    <p:cond delay="0"/>
-                                  </p:stCondLst>
-                                  <p:childTnLst>
-                                    <p:set>
-                                      <p:cBhvr>
-                                        <p:cTn id="6" dur="1" fill="hold">
-                                          <p:stCondLst>
-                                            <p:cond delay="0"/>
-                                          </p:stCondLst>
-                                        </p:cTn>
-                                        <p:tgtEl>
-                                          <p:spTgt spid="4"/>
-                                        </p:tgtEl>
-                                        <p:attrNameLst>
-                                          <p:attrName>style.visibility</p:attrName>
-                                        </p:attrNameLst>
-                                      </p:cBhvr>
-                                      <p:to>
-                                        <p:strVal val="visible"/>
-                                      </p:to>
-                                    </p:set>
-                                  </p:childTnLst>
-                                </p:cTn>
-                              </p:par>
-                            </p:childTnLst>
-                          </p:cTn>
-                        </p:par>
-                      </p:childTnLst>
-                    </p:cTn>
-                  </p:par>
-                </p:childTnLst>
-              </p:cTn>
-              <p:prevCondLst>
-                <p:cond evt="onPrev" delay="0">
-                  <p:tgtEl>
-                    <p:sldTgt/>
-                  </p:tgtEl>
-                </p:cond>
-              </p:prevCondLst>
-              <p:nextCondLst>
-                <p:cond evt="onNext" delay="0">
-                  <p:tgtEl>
-                    <p:sldTgt/>
-                  </p:tgtEl>
-                </p:cond>
-              </p:nextCondLst>
-            </p:seq>
-          </p:childTnLst>
-        </p:cTn>
-      </p:par>
-    </p:tnLst>
-    <p:bldLst>
-      <p:bldP spid="4" grpId="0" animBg="1"/>
-    </p:bldLst>
-  </p:timing>
 </p:sld>
 </file>
 
@@ -7593,7 +5996,7 @@
       </p:grpSpPr>
       <p:sp>
         <p:nvSpPr>
-          <p:cNvPr id="6" name="Title 5"/>
+          <p:cNvPr id="2" name="Title 1"/>
           <p:cNvSpPr>
             <a:spLocks noGrp="1"/>
           </p:cNvSpPr>
@@ -7610,14 +6013,14 @@
           <a:p>
             <a:r>
               <a:rPr lang="en-US" dirty="0"/>
-              <a:t>Example: Same Code, different purpose statement</a:t>
-            </a:r>
-          </a:p>
-        </p:txBody>
-      </p:sp>
-      <p:sp>
-        <p:nvSpPr>
-          <p:cNvPr id="7" name="Content Placeholder 6"/>
+              <a:t>What needs to be in my purpose statement?</a:t>
+            </a:r>
+          </a:p>
+        </p:txBody>
+      </p:sp>
+      <p:sp>
+        <p:nvSpPr>
+          <p:cNvPr id="3" name="Content Placeholder 2"/>
           <p:cNvSpPr>
             <a:spLocks noGrp="1"/>
           </p:cNvSpPr>
@@ -7625,470 +6028,48 @@
             <p:ph idx="1"/>
           </p:nvPr>
         </p:nvSpPr>
-        <p:spPr>
-          <a:xfrm>
-            <a:off x="381000" y="1600200"/>
-            <a:ext cx="8686800" cy="4724400"/>
-          </a:xfrm>
-        </p:spPr>
+        <p:spPr/>
         <p:txBody>
           <a:bodyPr>
-            <a:normAutofit fontScale="70000" lnSpcReduction="20000"/>
+            <a:noAutofit/>
           </a:bodyPr>
           <a:lstStyle/>
           <a:p>
-            <a:pPr marL="0" indent="0">
-              <a:buNone/>
-            </a:pPr>
-            <a:r>
-              <a:rPr lang="en-US" b="1" dirty="0">
-                <a:latin typeface="Consolas" pitchFamily="49" charset="0"/>
-                <a:cs typeface="Consolas" pitchFamily="49" charset="0"/>
-              </a:rPr>
-              <a:t>;; number-</a:t>
-            </a:r>
-            <a:r>
-              <a:rPr lang="en-US" b="1">
-                <a:latin typeface="Consolas" pitchFamily="49" charset="0"/>
-                <a:cs typeface="Consolas" pitchFamily="49" charset="0"/>
-              </a:rPr>
-              <a:t>sublist </a:t>
-            </a:r>
-            <a:r>
-              <a:rPr lang="en-US" b="1" dirty="0">
-                <a:latin typeface="Consolas" pitchFamily="49" charset="0"/>
-                <a:cs typeface="Consolas" pitchFamily="49" charset="0"/>
-              </a:rPr>
-              <a:t>: </a:t>
-            </a:r>
-          </a:p>
-          <a:p>
-            <a:pPr marL="0" indent="0">
-              <a:buNone/>
-            </a:pPr>
-            <a:r>
-              <a:rPr lang="en-US" b="1" dirty="0">
-                <a:latin typeface="Consolas" pitchFamily="49" charset="0"/>
-                <a:cs typeface="Consolas" pitchFamily="49" charset="0"/>
-              </a:rPr>
-              <a:t>;;     </a:t>
-            </a:r>
-            <a:r>
-              <a:rPr lang="en-US" b="1" dirty="0" err="1">
-                <a:latin typeface="Consolas" pitchFamily="49" charset="0"/>
-                <a:cs typeface="Consolas" pitchFamily="49" charset="0"/>
-              </a:rPr>
-              <a:t>ListOfX</a:t>
-            </a:r>
-            <a:r>
-              <a:rPr lang="en-US" b="1" dirty="0">
-                <a:latin typeface="Consolas" pitchFamily="49" charset="0"/>
-                <a:cs typeface="Consolas" pitchFamily="49" charset="0"/>
-              </a:rPr>
-              <a:t> Number -&gt; </a:t>
-            </a:r>
-            <a:r>
-              <a:rPr lang="en-US" b="1" dirty="0" err="1">
-                <a:latin typeface="Consolas" pitchFamily="49" charset="0"/>
-                <a:cs typeface="Consolas" pitchFamily="49" charset="0"/>
-              </a:rPr>
-              <a:t>NumberedListOfX</a:t>
-            </a:r>
-            <a:endParaRPr lang="en-US" b="1" dirty="0">
-              <a:latin typeface="Consolas" pitchFamily="49" charset="0"/>
-              <a:cs typeface="Consolas" pitchFamily="49" charset="0"/>
-            </a:endParaRPr>
-          </a:p>
-          <a:p>
-            <a:pPr>
-              <a:buNone/>
-            </a:pPr>
-            <a:r>
-              <a:rPr lang="en-US" b="1" dirty="0">
-                <a:latin typeface="Consolas" pitchFamily="49" charset="0"/>
-                <a:cs typeface="Consolas" pitchFamily="49" charset="0"/>
-              </a:rPr>
-              <a:t>;; GIVEN: a </a:t>
-            </a:r>
-            <a:r>
-              <a:rPr lang="en-US" b="1" dirty="0" err="1">
-                <a:latin typeface="Consolas" pitchFamily="49" charset="0"/>
-                <a:cs typeface="Consolas" pitchFamily="49" charset="0"/>
-              </a:rPr>
-              <a:t>sublist</a:t>
-            </a:r>
-            <a:r>
-              <a:rPr lang="en-US" b="1" dirty="0">
-                <a:latin typeface="Consolas" pitchFamily="49" charset="0"/>
-                <a:cs typeface="Consolas" pitchFamily="49" charset="0"/>
-              </a:rPr>
-              <a:t> </a:t>
-            </a:r>
-            <a:r>
-              <a:rPr lang="en-US" b="1" dirty="0" err="1">
-                <a:latin typeface="Consolas" pitchFamily="49" charset="0"/>
-                <a:cs typeface="Consolas" pitchFamily="49" charset="0"/>
-              </a:rPr>
-              <a:t>slst</a:t>
-            </a:r>
-            <a:r>
-              <a:rPr lang="en-US" b="1" dirty="0">
-                <a:latin typeface="Consolas" pitchFamily="49" charset="0"/>
-                <a:cs typeface="Consolas" pitchFamily="49" charset="0"/>
-              </a:rPr>
-              <a:t> of some list lst0</a:t>
-            </a:r>
-          </a:p>
-          <a:p>
-            <a:pPr>
-              <a:buNone/>
-            </a:pPr>
-            <a:r>
-              <a:rPr lang="en-US" b="1" dirty="0">
-                <a:latin typeface="Consolas" pitchFamily="49" charset="0"/>
-                <a:cs typeface="Consolas" pitchFamily="49" charset="0"/>
-              </a:rPr>
-              <a:t>;; </a:t>
-            </a:r>
-            <a:r>
-              <a:rPr lang="en-US" b="1" dirty="0">
-                <a:solidFill>
-                  <a:srgbClr val="FF0000"/>
-                </a:solidFill>
-                <a:latin typeface="Consolas" pitchFamily="49" charset="0"/>
-                <a:cs typeface="Consolas" pitchFamily="49" charset="0"/>
-              </a:rPr>
-              <a:t>WHERE: </a:t>
-            </a:r>
-            <a:r>
-              <a:rPr lang="en-US" b="1" dirty="0" err="1">
-                <a:solidFill>
-                  <a:srgbClr val="FF0000"/>
-                </a:solidFill>
-                <a:latin typeface="Consolas" pitchFamily="49" charset="0"/>
-                <a:cs typeface="Consolas" pitchFamily="49" charset="0"/>
-              </a:rPr>
-              <a:t>slst</a:t>
-            </a:r>
-            <a:r>
-              <a:rPr lang="en-US" b="1" dirty="0">
-                <a:solidFill>
-                  <a:srgbClr val="FF0000"/>
-                </a:solidFill>
-                <a:latin typeface="Consolas" pitchFamily="49" charset="0"/>
-                <a:cs typeface="Consolas" pitchFamily="49" charset="0"/>
-              </a:rPr>
-              <a:t> is the n-</a:t>
-            </a:r>
-            <a:r>
-              <a:rPr lang="en-US" b="1" dirty="0" err="1">
-                <a:solidFill>
-                  <a:srgbClr val="FF0000"/>
-                </a:solidFill>
-                <a:latin typeface="Consolas" pitchFamily="49" charset="0"/>
-                <a:cs typeface="Consolas" pitchFamily="49" charset="0"/>
-              </a:rPr>
-              <a:t>th</a:t>
-            </a:r>
-            <a:r>
-              <a:rPr lang="en-US" b="1" dirty="0">
-                <a:solidFill>
-                  <a:srgbClr val="FF0000"/>
-                </a:solidFill>
-                <a:latin typeface="Consolas" pitchFamily="49" charset="0"/>
-                <a:cs typeface="Consolas" pitchFamily="49" charset="0"/>
-              </a:rPr>
-              <a:t> </a:t>
-            </a:r>
-            <a:r>
-              <a:rPr lang="en-US" b="1" dirty="0" err="1">
-                <a:solidFill>
-                  <a:srgbClr val="FF0000"/>
-                </a:solidFill>
-                <a:latin typeface="Consolas" pitchFamily="49" charset="0"/>
-                <a:cs typeface="Consolas" pitchFamily="49" charset="0"/>
-              </a:rPr>
-              <a:t>sublist</a:t>
-            </a:r>
-            <a:r>
-              <a:rPr lang="en-US" b="1" dirty="0">
-                <a:solidFill>
-                  <a:srgbClr val="FF0000"/>
-                </a:solidFill>
-                <a:latin typeface="Consolas" pitchFamily="49" charset="0"/>
-                <a:cs typeface="Consolas" pitchFamily="49" charset="0"/>
-              </a:rPr>
-              <a:t> of lst0</a:t>
-            </a:r>
-          </a:p>
-          <a:p>
-            <a:pPr>
-              <a:buNone/>
-            </a:pPr>
-            <a:r>
-              <a:rPr lang="en-US" b="1" dirty="0">
-                <a:latin typeface="Consolas" pitchFamily="49" charset="0"/>
-                <a:cs typeface="Consolas" pitchFamily="49" charset="0"/>
-              </a:rPr>
-              <a:t>;; RETURNS: a copy of </a:t>
-            </a:r>
-            <a:r>
-              <a:rPr lang="en-US" b="1" dirty="0" err="1">
-                <a:latin typeface="Consolas" pitchFamily="49" charset="0"/>
-                <a:cs typeface="Consolas" pitchFamily="49" charset="0"/>
-              </a:rPr>
-              <a:t>slst</a:t>
-            </a:r>
-            <a:r>
-              <a:rPr lang="en-US" b="1" dirty="0">
-                <a:latin typeface="Consolas" pitchFamily="49" charset="0"/>
-                <a:cs typeface="Consolas" pitchFamily="49" charset="0"/>
-              </a:rPr>
-              <a:t> numbered according to its </a:t>
-            </a:r>
-          </a:p>
-          <a:p>
-            <a:pPr>
-              <a:buNone/>
-            </a:pPr>
-            <a:r>
-              <a:rPr lang="en-US" b="1" dirty="0">
-                <a:latin typeface="Consolas" pitchFamily="49" charset="0"/>
-                <a:cs typeface="Consolas" pitchFamily="49" charset="0"/>
-              </a:rPr>
-              <a:t>;;  position in lst0.</a:t>
-            </a:r>
-          </a:p>
-          <a:p>
-            <a:pPr>
-              <a:buNone/>
-            </a:pPr>
-            <a:r>
-              <a:rPr lang="en-US" b="1" dirty="0">
-                <a:latin typeface="Consolas" pitchFamily="49" charset="0"/>
-                <a:cs typeface="Consolas" pitchFamily="49" charset="0"/>
-              </a:rPr>
-              <a:t>;; STRATEGY: Use template for </a:t>
-            </a:r>
-            <a:r>
-              <a:rPr lang="en-US" b="1" dirty="0" err="1">
-                <a:latin typeface="Consolas" pitchFamily="49" charset="0"/>
-                <a:cs typeface="Consolas" pitchFamily="49" charset="0"/>
-              </a:rPr>
-              <a:t>ListOfX</a:t>
-            </a:r>
-            <a:r>
-              <a:rPr lang="en-US" b="1" dirty="0">
-                <a:latin typeface="Consolas" pitchFamily="49" charset="0"/>
-                <a:cs typeface="Consolas" pitchFamily="49" charset="0"/>
-              </a:rPr>
-              <a:t> on </a:t>
-            </a:r>
-            <a:r>
-              <a:rPr lang="en-US" b="1" dirty="0" err="1">
-                <a:latin typeface="Consolas" pitchFamily="49" charset="0"/>
-                <a:cs typeface="Consolas" pitchFamily="49" charset="0"/>
-              </a:rPr>
-              <a:t>slst</a:t>
-            </a:r>
-            <a:endParaRPr lang="en-US" b="1" dirty="0">
-              <a:latin typeface="Consolas" pitchFamily="49" charset="0"/>
-              <a:cs typeface="Consolas" pitchFamily="49" charset="0"/>
-            </a:endParaRPr>
-          </a:p>
-          <a:p>
-            <a:pPr>
-              <a:buNone/>
-            </a:pPr>
-            <a:r>
-              <a:rPr lang="en-US" b="1" dirty="0">
-                <a:latin typeface="Consolas" pitchFamily="49" charset="0"/>
-                <a:cs typeface="Consolas" pitchFamily="49" charset="0"/>
-              </a:rPr>
-              <a:t>(define (number-</a:t>
-            </a:r>
-            <a:r>
-              <a:rPr lang="en-US" b="1" dirty="0" err="1">
-                <a:latin typeface="Consolas" pitchFamily="49" charset="0"/>
-                <a:cs typeface="Consolas" pitchFamily="49" charset="0"/>
-              </a:rPr>
-              <a:t>sublist</a:t>
-            </a:r>
-            <a:r>
-              <a:rPr lang="en-US" b="1" dirty="0">
-                <a:latin typeface="Consolas" pitchFamily="49" charset="0"/>
-                <a:cs typeface="Consolas" pitchFamily="49" charset="0"/>
-              </a:rPr>
-              <a:t> </a:t>
-            </a:r>
-            <a:r>
-              <a:rPr lang="en-US" b="1" dirty="0" err="1">
-                <a:latin typeface="Consolas" pitchFamily="49" charset="0"/>
-                <a:cs typeface="Consolas" pitchFamily="49" charset="0"/>
-              </a:rPr>
-              <a:t>slst</a:t>
-            </a:r>
-            <a:r>
-              <a:rPr lang="en-US" b="1" dirty="0">
-                <a:latin typeface="Consolas" pitchFamily="49" charset="0"/>
-                <a:cs typeface="Consolas" pitchFamily="49" charset="0"/>
-              </a:rPr>
-              <a:t> n)</a:t>
-            </a:r>
-          </a:p>
-          <a:p>
-            <a:pPr>
-              <a:buNone/>
-            </a:pPr>
-            <a:r>
-              <a:rPr lang="en-US" b="1" dirty="0">
-                <a:latin typeface="Consolas" pitchFamily="49" charset="0"/>
-                <a:cs typeface="Consolas" pitchFamily="49" charset="0"/>
-              </a:rPr>
-              <a:t>  (</a:t>
-            </a:r>
-            <a:r>
-              <a:rPr lang="en-US" b="1" dirty="0" err="1">
-                <a:latin typeface="Consolas" pitchFamily="49" charset="0"/>
-                <a:cs typeface="Consolas" pitchFamily="49" charset="0"/>
-              </a:rPr>
-              <a:t>cond</a:t>
-            </a:r>
-            <a:endParaRPr lang="en-US" b="1" dirty="0">
-              <a:latin typeface="Consolas" pitchFamily="49" charset="0"/>
-              <a:cs typeface="Consolas" pitchFamily="49" charset="0"/>
-            </a:endParaRPr>
-          </a:p>
-          <a:p>
-            <a:pPr>
-              <a:buNone/>
-            </a:pPr>
-            <a:r>
-              <a:rPr lang="en-US" b="1" dirty="0">
-                <a:latin typeface="Consolas" pitchFamily="49" charset="0"/>
-                <a:cs typeface="Consolas" pitchFamily="49" charset="0"/>
-              </a:rPr>
-              <a:t>    [(empty? </a:t>
-            </a:r>
-            <a:r>
-              <a:rPr lang="en-US" b="1" dirty="0" err="1">
-                <a:latin typeface="Consolas" pitchFamily="49" charset="0"/>
-                <a:cs typeface="Consolas" pitchFamily="49" charset="0"/>
-              </a:rPr>
-              <a:t>slst</a:t>
-            </a:r>
-            <a:r>
-              <a:rPr lang="en-US" b="1" dirty="0">
-                <a:latin typeface="Consolas" pitchFamily="49" charset="0"/>
-                <a:cs typeface="Consolas" pitchFamily="49" charset="0"/>
-              </a:rPr>
-              <a:t>) empty]</a:t>
-            </a:r>
-          </a:p>
-          <a:p>
-            <a:pPr>
-              <a:buNone/>
-            </a:pPr>
-            <a:r>
-              <a:rPr lang="en-US" b="1" dirty="0">
-                <a:latin typeface="Consolas" pitchFamily="49" charset="0"/>
-                <a:cs typeface="Consolas" pitchFamily="49" charset="0"/>
-              </a:rPr>
-              <a:t>    [else</a:t>
-            </a:r>
-          </a:p>
-          <a:p>
-            <a:pPr>
-              <a:buNone/>
-            </a:pPr>
-            <a:r>
-              <a:rPr lang="en-US" b="1" dirty="0">
-                <a:latin typeface="Consolas" pitchFamily="49" charset="0"/>
-                <a:cs typeface="Consolas" pitchFamily="49" charset="0"/>
-              </a:rPr>
-              <a:t>      (cons</a:t>
-            </a:r>
-          </a:p>
-          <a:p>
-            <a:pPr>
-              <a:buNone/>
-            </a:pPr>
-            <a:r>
-              <a:rPr lang="en-US" b="1" dirty="0">
-                <a:latin typeface="Consolas" pitchFamily="49" charset="0"/>
-                <a:cs typeface="Consolas" pitchFamily="49" charset="0"/>
-              </a:rPr>
-              <a:t>        (list n (first </a:t>
-            </a:r>
-            <a:r>
-              <a:rPr lang="en-US" b="1" dirty="0" err="1">
-                <a:latin typeface="Consolas" pitchFamily="49" charset="0"/>
-                <a:cs typeface="Consolas" pitchFamily="49" charset="0"/>
-              </a:rPr>
-              <a:t>slst</a:t>
-            </a:r>
-            <a:r>
-              <a:rPr lang="en-US" b="1" dirty="0">
-                <a:latin typeface="Consolas" pitchFamily="49" charset="0"/>
-                <a:cs typeface="Consolas" pitchFamily="49" charset="0"/>
-              </a:rPr>
-              <a:t>))</a:t>
-            </a:r>
-          </a:p>
-          <a:p>
-            <a:pPr>
-              <a:buNone/>
-            </a:pPr>
-            <a:r>
-              <a:rPr lang="en-US" b="1" dirty="0">
-                <a:latin typeface="Consolas" pitchFamily="49" charset="0"/>
-                <a:cs typeface="Consolas" pitchFamily="49" charset="0"/>
-              </a:rPr>
-              <a:t>        (number-</a:t>
-            </a:r>
-            <a:r>
-              <a:rPr lang="en-US" b="1" dirty="0" err="1">
-                <a:latin typeface="Consolas" pitchFamily="49" charset="0"/>
-                <a:cs typeface="Consolas" pitchFamily="49" charset="0"/>
-              </a:rPr>
-              <a:t>sublist</a:t>
-            </a:r>
-            <a:r>
-              <a:rPr lang="en-US" b="1" dirty="0">
-                <a:latin typeface="Consolas" pitchFamily="49" charset="0"/>
-                <a:cs typeface="Consolas" pitchFamily="49" charset="0"/>
-              </a:rPr>
-              <a:t> (rest </a:t>
-            </a:r>
-            <a:r>
-              <a:rPr lang="en-US" b="1" dirty="0" err="1">
-                <a:latin typeface="Consolas" pitchFamily="49" charset="0"/>
-                <a:cs typeface="Consolas" pitchFamily="49" charset="0"/>
-              </a:rPr>
-              <a:t>slst</a:t>
-            </a:r>
-            <a:r>
-              <a:rPr lang="en-US" b="1" dirty="0">
-                <a:latin typeface="Consolas" pitchFamily="49" charset="0"/>
-                <a:cs typeface="Consolas" pitchFamily="49" charset="0"/>
-              </a:rPr>
-              <a:t>) (+ n 1)))]))</a:t>
-            </a:r>
-          </a:p>
-          <a:p>
-            <a:pPr>
-              <a:buNone/>
-            </a:pPr>
-            <a:endParaRPr lang="en-US" b="1" dirty="0">
-              <a:latin typeface="Consolas" pitchFamily="49" charset="0"/>
-              <a:cs typeface="Consolas" pitchFamily="49" charset="0"/>
-            </a:endParaRPr>
-          </a:p>
-        </p:txBody>
-      </p:sp>
-      <p:sp>
-        <p:nvSpPr>
-          <p:cNvPr id="2" name="Slide Number Placeholder 1"/>
+            <a:r>
+              <a:rPr lang="en-US" sz="2400" dirty="0"/>
+              <a:t>The purpose statement must account for all the parameters.</a:t>
+            </a:r>
+          </a:p>
+          <a:p>
+            <a:pPr lvl="1"/>
+            <a:r>
+              <a:rPr lang="en-US" sz="2000" dirty="0"/>
+              <a:t>if it doesn't then either you are passing more parameters than you need, or there's something going on that you haven't described.</a:t>
+            </a:r>
+          </a:p>
+          <a:p>
+            <a:r>
+              <a:rPr lang="en-US" sz="2400" dirty="0"/>
+              <a:t>The RETURNS clause must describe the value returned by the function for all possible values of the parameters.</a:t>
+            </a:r>
+          </a:p>
+          <a:p>
+            <a:r>
+              <a:rPr lang="en-US" sz="2400" dirty="0"/>
+              <a:t>If the RETURNS clause describes the value returned by the function only for some values of the arguments or some combination of arguments, then that restriction must be stated in a WHERE clause.</a:t>
+            </a:r>
+          </a:p>
+          <a:p>
+            <a:r>
+              <a:rPr lang="en-US" sz="2400" dirty="0"/>
+              <a:t>It becomes the responsibility of the caller to guarantee that the restriction is satisfied.</a:t>
+            </a:r>
+          </a:p>
+        </p:txBody>
+      </p:sp>
+      <p:sp>
+        <p:nvSpPr>
+          <p:cNvPr id="4" name="Slide Number Placeholder 3"/>
           <p:cNvSpPr>
             <a:spLocks noGrp="1"/>
           </p:cNvSpPr>
@@ -8109,339 +6090,16 @@
           </a:p>
         </p:txBody>
       </p:sp>
-      <p:sp>
-        <p:nvSpPr>
-          <p:cNvPr id="3" name="Rectangle 2"/>
-          <p:cNvSpPr/>
-          <p:nvPr/>
-        </p:nvSpPr>
-        <p:spPr>
-          <a:xfrm>
-            <a:off x="228600" y="21236"/>
-            <a:ext cx="3352800" cy="1524000"/>
-          </a:xfrm>
-          <a:prstGeom prst="rect">
-            <a:avLst/>
-          </a:prstGeom>
-          <a:solidFill>
-            <a:schemeClr val="accent3">
-              <a:lumMod val="40000"/>
-              <a:lumOff val="60000"/>
-            </a:schemeClr>
-          </a:solidFill>
-        </p:spPr>
-        <p:style>
-          <a:lnRef idx="1">
-            <a:schemeClr val="accent3"/>
-          </a:lnRef>
-          <a:fillRef idx="2">
-            <a:schemeClr val="accent3"/>
-          </a:fillRef>
-          <a:effectRef idx="1">
-            <a:schemeClr val="accent3"/>
-          </a:effectRef>
-          <a:fontRef idx="minor">
-            <a:schemeClr val="dk1"/>
-          </a:fontRef>
-        </p:style>
-        <p:txBody>
-          <a:bodyPr rot="0" spcFirstLastPara="0" vertOverflow="overflow" horzOverflow="overflow" vert="horz" wrap="square" lIns="91440" tIns="45720" rIns="91440" bIns="45720" numCol="1" spcCol="0" rtlCol="0" fromWordArt="0" anchor="ctr" anchorCtr="0" forceAA="0" compatLnSpc="1">
-            <a:prstTxWarp prst="textNoShape">
-              <a:avLst/>
-            </a:prstTxWarp>
-            <a:noAutofit/>
-          </a:bodyPr>
-          <a:lstStyle/>
-          <a:p>
-            <a:pPr algn="ctr"/>
-            <a:r>
-              <a:rPr lang="en-US" sz="2400" dirty="0"/>
-              <a:t>Function can't fulfill its purpose unless it knows where </a:t>
-            </a:r>
-            <a:r>
-              <a:rPr lang="en-US" sz="2400" dirty="0" err="1"/>
-              <a:t>slst</a:t>
-            </a:r>
-            <a:r>
-              <a:rPr lang="en-US" sz="2400" dirty="0"/>
-              <a:t> is in lst0</a:t>
-            </a:r>
-          </a:p>
-        </p:txBody>
-      </p:sp>
-      <p:sp>
-        <p:nvSpPr>
-          <p:cNvPr id="4" name="Rectangle 3"/>
-          <p:cNvSpPr/>
-          <p:nvPr/>
-        </p:nvSpPr>
-        <p:spPr>
-          <a:xfrm>
-            <a:off x="5257800" y="4343400"/>
-            <a:ext cx="3657600" cy="1219200"/>
-          </a:xfrm>
-          <a:prstGeom prst="rect">
-            <a:avLst/>
-          </a:prstGeom>
-          <a:solidFill>
-            <a:schemeClr val="accent3">
-              <a:lumMod val="40000"/>
-              <a:lumOff val="60000"/>
-            </a:schemeClr>
-          </a:solidFill>
-        </p:spPr>
-        <p:style>
-          <a:lnRef idx="1">
-            <a:schemeClr val="accent3"/>
-          </a:lnRef>
-          <a:fillRef idx="2">
-            <a:schemeClr val="accent3"/>
-          </a:fillRef>
-          <a:effectRef idx="1">
-            <a:schemeClr val="accent3"/>
-          </a:effectRef>
-          <a:fontRef idx="minor">
-            <a:schemeClr val="dk1"/>
-          </a:fontRef>
-        </p:style>
-        <p:txBody>
-          <a:bodyPr rot="0" spcFirstLastPara="0" vertOverflow="overflow" horzOverflow="overflow" vert="horz" wrap="square" lIns="91440" tIns="45720" rIns="91440" bIns="45720" numCol="1" spcCol="0" rtlCol="0" fromWordArt="0" anchor="ctr" anchorCtr="0" forceAA="0" compatLnSpc="1">
-            <a:prstTxWarp prst="textNoShape">
-              <a:avLst/>
-            </a:prstTxWarp>
-            <a:noAutofit/>
-          </a:bodyPr>
-          <a:lstStyle/>
-          <a:p>
-            <a:pPr algn="ctr"/>
-            <a:r>
-              <a:rPr lang="en-US" sz="2400" dirty="0"/>
-              <a:t>Invariant supplies the extra information</a:t>
-            </a:r>
-          </a:p>
-        </p:txBody>
-      </p:sp>
-      <p:sp>
-        <p:nvSpPr>
-          <p:cNvPr id="15" name="Rectangle 14"/>
-          <p:cNvSpPr/>
-          <p:nvPr/>
-        </p:nvSpPr>
-        <p:spPr>
-          <a:xfrm>
-            <a:off x="381000" y="2548328"/>
-            <a:ext cx="8229600" cy="423472"/>
-          </a:xfrm>
-          <a:prstGeom prst="rect">
-            <a:avLst/>
-          </a:prstGeom>
-          <a:solidFill>
-            <a:schemeClr val="bg1"/>
-          </a:solidFill>
-          <a:ln w="12700">
-            <a:noFill/>
-            <a:tailEnd type="stealth" w="lg" len="lg"/>
-          </a:ln>
-          <a:effectLst/>
-        </p:spPr>
-        <p:style>
-          <a:lnRef idx="1">
-            <a:schemeClr val="accent3"/>
-          </a:lnRef>
-          <a:fillRef idx="2">
-            <a:schemeClr val="accent3"/>
-          </a:fillRef>
-          <a:effectRef idx="1">
-            <a:schemeClr val="accent3"/>
-          </a:effectRef>
-          <a:fontRef idx="minor">
-            <a:schemeClr val="dk1"/>
-          </a:fontRef>
-        </p:style>
-        <p:txBody>
-          <a:bodyPr rot="0" spcFirstLastPara="0" vertOverflow="overflow" horzOverflow="overflow" vert="horz" wrap="square" lIns="91440" tIns="45720" rIns="91440" bIns="45720" numCol="1" spcCol="0" rtlCol="0" fromWordArt="0" anchor="ctr" anchorCtr="0" forceAA="0" compatLnSpc="1">
-            <a:prstTxWarp prst="textNoShape">
-              <a:avLst/>
-            </a:prstTxWarp>
-            <a:noAutofit/>
-          </a:bodyPr>
-          <a:lstStyle/>
-          <a:p>
-            <a:pPr algn="ctr"/>
-            <a:endParaRPr lang="en-US"/>
-          </a:p>
-        </p:txBody>
-      </p:sp>
     </p:spTree>
     <p:extLst>
       <p:ext uri="{BB962C8B-B14F-4D97-AF65-F5344CB8AC3E}">
-        <p14:creationId xmlns:p14="http://schemas.microsoft.com/office/powerpoint/2010/main" val="3151900343"/>
+        <p14:creationId xmlns:p14="http://schemas.microsoft.com/office/powerpoint/2010/main" val="1327706209"/>
       </p:ext>
     </p:extLst>
   </p:cSld>
   <p:clrMapOvr>
     <a:masterClrMapping/>
   </p:clrMapOvr>
-  <p:timing>
-    <p:tnLst>
-      <p:par>
-        <p:cTn id="1" dur="indefinite" restart="never" nodeType="tmRoot">
-          <p:childTnLst>
-            <p:seq concurrent="1" nextAc="seek">
-              <p:cTn id="2" dur="indefinite" nodeType="mainSeq">
-                <p:childTnLst>
-                  <p:par>
-                    <p:cTn id="3" fill="hold">
-                      <p:stCondLst>
-                        <p:cond delay="indefinite"/>
-                      </p:stCondLst>
-                      <p:childTnLst>
-                        <p:par>
-                          <p:cTn id="4" fill="hold">
-                            <p:stCondLst>
-                              <p:cond delay="0"/>
-                            </p:stCondLst>
-                            <p:childTnLst>
-                              <p:par>
-                                <p:cTn id="5" presetID="1" presetClass="entr" presetSubtype="0" fill="hold" grpId="0" nodeType="clickEffect">
-                                  <p:stCondLst>
-                                    <p:cond delay="0"/>
-                                  </p:stCondLst>
-                                  <p:childTnLst>
-                                    <p:set>
-                                      <p:cBhvr>
-                                        <p:cTn id="6" dur="1" fill="hold">
-                                          <p:stCondLst>
-                                            <p:cond delay="0"/>
-                                          </p:stCondLst>
-                                        </p:cTn>
-                                        <p:tgtEl>
-                                          <p:spTgt spid="3"/>
-                                        </p:tgtEl>
-                                        <p:attrNameLst>
-                                          <p:attrName>style.visibility</p:attrName>
-                                        </p:attrNameLst>
-                                      </p:cBhvr>
-                                      <p:to>
-                                        <p:strVal val="visible"/>
-                                      </p:to>
-                                    </p:set>
-                                  </p:childTnLst>
-                                </p:cTn>
-                              </p:par>
-                            </p:childTnLst>
-                          </p:cTn>
-                        </p:par>
-                      </p:childTnLst>
-                    </p:cTn>
-                  </p:par>
-                  <p:par>
-                    <p:cTn id="7" fill="hold">
-                      <p:stCondLst>
-                        <p:cond delay="indefinite"/>
-                      </p:stCondLst>
-                      <p:childTnLst>
-                        <p:par>
-                          <p:cTn id="8" fill="hold">
-                            <p:stCondLst>
-                              <p:cond delay="0"/>
-                            </p:stCondLst>
-                            <p:childTnLst>
-                              <p:par>
-                                <p:cTn id="9" presetID="10" presetClass="exit" presetSubtype="0" fill="hold" grpId="0" nodeType="clickEffect">
-                                  <p:stCondLst>
-                                    <p:cond delay="0"/>
-                                  </p:stCondLst>
-                                  <p:childTnLst>
-                                    <p:animEffect transition="out" filter="fade">
-                                      <p:cBhvr>
-                                        <p:cTn id="10" dur="500"/>
-                                        <p:tgtEl>
-                                          <p:spTgt spid="15"/>
-                                        </p:tgtEl>
-                                      </p:cBhvr>
-                                    </p:animEffect>
-                                    <p:set>
-                                      <p:cBhvr>
-                                        <p:cTn id="11" dur="1" fill="hold">
-                                          <p:stCondLst>
-                                            <p:cond delay="499"/>
-                                          </p:stCondLst>
-                                        </p:cTn>
-                                        <p:tgtEl>
-                                          <p:spTgt spid="15"/>
-                                        </p:tgtEl>
-                                        <p:attrNameLst>
-                                          <p:attrName>style.visibility</p:attrName>
-                                        </p:attrNameLst>
-                                      </p:cBhvr>
-                                      <p:to>
-                                        <p:strVal val="hidden"/>
-                                      </p:to>
-                                    </p:set>
-                                  </p:childTnLst>
-                                </p:cTn>
-                              </p:par>
-                              <p:par>
-                                <p:cTn id="12" presetID="1" presetClass="entr" presetSubtype="0" fill="hold" grpId="0" nodeType="withEffect">
-                                  <p:stCondLst>
-                                    <p:cond delay="0"/>
-                                  </p:stCondLst>
-                                  <p:childTnLst>
-                                    <p:set>
-                                      <p:cBhvr>
-                                        <p:cTn id="13" dur="1" fill="hold">
-                                          <p:stCondLst>
-                                            <p:cond delay="0"/>
-                                          </p:stCondLst>
-                                        </p:cTn>
-                                        <p:tgtEl>
-                                          <p:spTgt spid="4"/>
-                                        </p:tgtEl>
-                                        <p:attrNameLst>
-                                          <p:attrName>style.visibility</p:attrName>
-                                        </p:attrNameLst>
-                                      </p:cBhvr>
-                                      <p:to>
-                                        <p:strVal val="visible"/>
-                                      </p:to>
-                                    </p:set>
-                                  </p:childTnLst>
-                                </p:cTn>
-                              </p:par>
-                            </p:childTnLst>
-                          </p:cTn>
-                        </p:par>
-                      </p:childTnLst>
-                    </p:cTn>
-                  </p:par>
-                </p:childTnLst>
-              </p:cTn>
-              <p:prevCondLst>
-                <p:cond evt="onPrev" delay="0">
-                  <p:tgtEl>
-                    <p:sldTgt/>
-                  </p:tgtEl>
-                </p:cond>
-              </p:prevCondLst>
-              <p:nextCondLst>
-                <p:cond evt="onNext" delay="0">
-                  <p:tgtEl>
-                    <p:sldTgt/>
-                  </p:tgtEl>
-                </p:cond>
-              </p:nextCondLst>
-            </p:seq>
-          </p:childTnLst>
-        </p:cTn>
-      </p:par>
-    </p:tnLst>
-    <p:bldLst>
-      <p:bldP spid="3" grpId="0" animBg="1"/>
-      <p:bldP spid="4" grpId="0" animBg="1"/>
-      <p:bldP spid="15" grpId="0" animBg="1"/>
-    </p:bldLst>
-  </p:timing>
 </p:sld>
 </file>
 
@@ -8481,7 +6139,7 @@
           <a:p>
             <a:r>
               <a:rPr lang="en-US" dirty="0"/>
-              <a:t>Wait, weren't those functions very similar?</a:t>
+              <a:t>Summary: When do I need an invariant? </a:t>
             </a:r>
           </a:p>
         </p:txBody>
@@ -8503,14 +6161,23 @@
           <a:p>
             <a:r>
               <a:rPr lang="en-US" dirty="0"/>
-              <a:t>Yes.  In fact they were identical (except for their names).</a:t>
+              <a:t>It all depends on your purpose statement!</a:t>
             </a:r>
           </a:p>
           <a:p>
             <a:r>
               <a:rPr lang="en-US" dirty="0"/>
-              <a:t>The moral of the story is that it is the purpose statement that determines whether you need an invariant.</a:t>
-            </a:r>
+              <a:t>If the function needs additional information to fulfill its stated purpose, and that information is not in the arguments, then you need an invariant to document the needed information.</a:t>
+            </a:r>
+          </a:p>
+          <a:p>
+            <a:r>
+              <a:rPr lang="en-US" dirty="0"/>
+              <a:t>It is up to each caller of the function to make sure that the invariant is true at every call.</a:t>
+            </a:r>
+          </a:p>
+          <a:p>
+            <a:endParaRPr lang="en-US" dirty="0"/>
           </a:p>
         </p:txBody>
       </p:sp>
@@ -8540,7 +6207,7 @@
     </p:spTree>
     <p:extLst>
       <p:ext uri="{BB962C8B-B14F-4D97-AF65-F5344CB8AC3E}">
-        <p14:creationId xmlns:p14="http://schemas.microsoft.com/office/powerpoint/2010/main" val="3866762002"/>
+        <p14:creationId xmlns:p14="http://schemas.microsoft.com/office/powerpoint/2010/main" val="2810350204"/>
       </p:ext>
     </p:extLst>
   </p:cSld>

</xml_diff>